<commit_message>
Alteração dos slides por benjamin
</commit_message>
<xml_diff>
--- a/Slide-do-Licenciamento.pptx
+++ b/Slide-do-Licenciamento.pptx
@@ -5,7 +5,7 @@
     <p:sldMasterId id="2147483648" r:id="rId1"/>
   </p:sldMasterIdLst>
   <p:notesMasterIdLst>
-    <p:notesMasterId r:id="rId15"/>
+    <p:notesMasterId r:id="rId18"/>
   </p:notesMasterIdLst>
   <p:sldIdLst>
     <p:sldId id="256" r:id="rId6"/>
@@ -17,21 +17,24 @@
     <p:sldId id="262" r:id="rId12"/>
     <p:sldId id="263" r:id="rId13"/>
     <p:sldId id="264" r:id="rId14"/>
+    <p:sldId id="265" r:id="rId15"/>
+    <p:sldId id="266" r:id="rId16"/>
+    <p:sldId id="267" r:id="rId17"/>
   </p:sldIdLst>
   <p:sldSz cx="9753600" cy="7315200"/>
   <p:notesSz cx="6858000" cy="9144000"/>
   <p:embeddedFontLst>
     <p:embeddedFont>
       <p:font typeface="Arial" charset="1" panose="020B0604020202020204"/>
-      <p:regular r:id="rId18"/>
+      <p:regular r:id="rId21"/>
     </p:embeddedFont>
     <p:embeddedFont>
-      <p:font typeface="Arial Bold" charset="1" panose="020B0704020202020204"/>
+      <p:font typeface="Century Gothic Paneuropean" charset="1" panose="020B0502020202020204"/>
       <p:regular r:id="rId23"/>
     </p:embeddedFont>
     <p:embeddedFont>
       <p:font typeface="Open Sans" charset="1" panose="020B0606030504020204"/>
-      <p:regular r:id="rId25"/>
+      <p:regular r:id="rId31"/>
     </p:embeddedFont>
   </p:embeddedFontLst>
   <p:defaultTextStyle>
@@ -483,6 +486,645 @@
 </file>
 
 <file path=ppt/notesSlides/notesSlide1.xml><?xml version="1.0" encoding="utf-8"?>
+<p:notes xmlns:p="http://schemas.openxmlformats.org/presentationml/2006/main" xmlns:a="http://schemas.openxmlformats.org/drawingml/2006/main">
+  <p:cSld>
+    <p:spTree xmlns:r="http://schemas.openxmlformats.org/officeDocument/2006/relationships">
+      <p:nvGrpSpPr>
+        <p:cNvPr id="1" name=""/>
+        <p:cNvGrpSpPr/>
+        <p:nvPr/>
+      </p:nvGrpSpPr>
+      <p:grpSpPr>
+        <a:xfrm>
+          <a:off x="0" y="0"/>
+          <a:ext cx="0" cy="0"/>
+          <a:chOff x="0" y="0"/>
+          <a:chExt cx="0" cy="0"/>
+        </a:xfrm>
+      </p:grpSpPr>
+      <p:sp>
+        <p:nvSpPr>
+          <p:cNvPr id="2" name="Header Placeholder 1"/>
+          <p:cNvSpPr>
+            <a:spLocks noGrp="1"/>
+          </p:cNvSpPr>
+          <p:nvPr>
+            <p:ph type="hdr" sz="quarter"/>
+          </p:nvPr>
+        </p:nvSpPr>
+        <p:spPr>
+          <a:xfrm>
+            <a:off x="0" y="0"/>
+            <a:ext cx="3962400" cy="342900"/>
+          </a:xfrm>
+          <a:prstGeom prst="rect">
+            <a:avLst/>
+          </a:prstGeom>
+        </p:spPr>
+        <p:txBody>
+          <a:bodyPr vert="horz" lIns="91440" tIns="45720" rIns="91440" bIns="45720" rtlCol="0"/>
+          <a:lstStyle>
+            <a:lvl1pPr algn="l">
+              <a:defRPr sz="1200"/>
+            </a:lvl1pPr>
+          </a:lstStyle>
+          <a:p/>
+        </p:txBody>
+      </p:sp>
+      <p:sp>
+        <p:nvSpPr>
+          <p:cNvPr id="3" name="Date Placeholder 2"/>
+          <p:cNvSpPr>
+            <a:spLocks noGrp="1"/>
+          </p:cNvSpPr>
+          <p:nvPr>
+            <p:ph type="dt" idx="1"/>
+          </p:nvPr>
+        </p:nvSpPr>
+        <p:spPr>
+          <a:xfrm>
+            <a:off x="5180013" y="0"/>
+            <a:ext cx="3962400" cy="342900"/>
+          </a:xfrm>
+          <a:prstGeom prst="rect">
+            <a:avLst/>
+          </a:prstGeom>
+        </p:spPr>
+        <p:txBody>
+          <a:bodyPr vert="horz" lIns="91440" tIns="45720" rIns="91440" bIns="45720" rtlCol="0"/>
+          <a:lstStyle>
+            <a:lvl1pPr algn="r">
+              <a:defRPr sz="1200"/>
+            </a:lvl1pPr>
+          </a:lstStyle>
+          <a:p>
+            <a:r id="{B7268E1E-0E44-426D-905E-8AD9B19D2182}" type="datetimeFigureOut">
+              <a:rPr lang="cs-CZ" smtClean="0"/>
+              <a:t>1.7.2013</a:t>
+            </a:r>
+          </a:p>
+        </p:txBody>
+      </p:sp>
+      <p:sp>
+        <p:nvSpPr>
+          <p:cNvPr id="4" name="Slide Image Placeholder 3"/>
+          <p:cNvSpPr>
+            <a:spLocks noGrp="1" noRot="1" noChangeAspect="1"/>
+          </p:cNvSpPr>
+          <p:nvPr>
+            <p:ph type="sldImg" idx="2"/>
+          </p:nvPr>
+        </p:nvSpPr>
+        <p:spPr>
+          <a:xfrm>
+            <a:off x="2857500" y="512763"/>
+            <a:ext cx="3429000" cy="2566987"/>
+          </a:xfrm>
+          <a:prstGeom prst="rect">
+            <a:avLst/>
+          </a:prstGeom>
+          <a:noFill/>
+          <a:ln w="12700">
+            <a:solidFill>
+              <a:prstClr val="black"/>
+            </a:solidFill>
+          </a:ln>
+        </p:spPr>
+        <p:txBody>
+          <a:bodyPr vert="horz" lIns="91440" tIns="45720" rIns="91440" bIns="45720" rtlCol="0" anchor="ctr"/>
+          <a:lstStyle/>
+          <a:p/>
+        </p:txBody>
+      </p:sp>
+      <p:sp>
+        <p:nvSpPr>
+          <p:cNvPr id="5" name="Notes Placeholder 4"/>
+          <p:cNvSpPr>
+            <a:spLocks noGrp="1"/>
+          </p:cNvSpPr>
+          <p:nvPr>
+            <p:ph type="body" sz="quarter" idx="3"/>
+          </p:nvPr>
+        </p:nvSpPr>
+        <p:spPr>
+          <a:xfrm>
+            <a:off x="914400" y="3251200"/>
+            <a:ext cx="7315200" cy="3081338"/>
+          </a:xfrm>
+          <a:prstGeom prst="rect">
+            <a:avLst/>
+          </a:prstGeom>
+        </p:spPr>
+        <p:txBody>
+          <a:bodyPr vert="horz" lIns="91440" tIns="45720" rIns="91440" bIns="45720" rtlCol="0"/>
+          <a:lstStyle/>
+          <a:p>
+            <a:r>
+              <a:rPr lang="en-US"/>
+              <a:t>&lt;number&gt;</a:t>
+            </a:r>
+            <a:endParaRPr lang="en-US" smtClean="0"/>
+          </a:p>
+        </p:txBody>
+      </p:sp>
+      <p:sp>
+        <p:nvSpPr>
+          <p:cNvPr id="6" name="Footer Placeholder 5"/>
+          <p:cNvSpPr>
+            <a:spLocks noGrp="1"/>
+          </p:cNvSpPr>
+          <p:nvPr>
+            <p:ph type="ftr" sz="quarter" idx="4"/>
+          </p:nvPr>
+        </p:nvSpPr>
+        <p:spPr>
+          <a:xfrm>
+            <a:off x="0" y="6502400"/>
+            <a:ext cx="3962400" cy="341313"/>
+          </a:xfrm>
+          <a:prstGeom prst="rect">
+            <a:avLst/>
+          </a:prstGeom>
+        </p:spPr>
+        <p:txBody>
+          <a:bodyPr vert="horz" lIns="91440" tIns="45720" rIns="91440" bIns="45720" rtlCol="0" anchor="b"/>
+          <a:lstStyle>
+            <a:lvl1pPr algn="l">
+              <a:defRPr sz="1200"/>
+            </a:lvl1pPr>
+          </a:lstStyle>
+          <a:p/>
+        </p:txBody>
+      </p:sp>
+      <p:sp>
+        <p:nvSpPr>
+          <p:cNvPr id="7" name="Slide Number Placeholder 6"/>
+          <p:cNvSpPr>
+            <a:spLocks noGrp="1"/>
+          </p:cNvSpPr>
+          <p:nvPr>
+            <p:ph type="sldNum" sz="quarter" idx="5"/>
+          </p:nvPr>
+        </p:nvSpPr>
+        <p:spPr>
+          <a:xfrm>
+            <a:off x="5180013" y="6502400"/>
+            <a:ext cx="3962400" cy="341313"/>
+          </a:xfrm>
+          <a:prstGeom prst="rect">
+            <a:avLst/>
+          </a:prstGeom>
+        </p:spPr>
+        <p:txBody>
+          <a:bodyPr vert="horz" lIns="91440" tIns="45720" rIns="91440" bIns="45720" rtlCol="0" anchor="b"/>
+          <a:lstStyle>
+            <a:lvl1pPr algn="r">
+              <a:defRPr sz="1200"/>
+            </a:lvl1pPr>
+          </a:lstStyle>
+          <a:p>
+            <a:r id="{871B2431-D351-4C6E-A3CF-9DFAC0E3E050}" type="slidenum">
+              <a:rPr lang="cs-CZ" smtClean="0"/>
+              <a:t>‹#›</a:t>
+            </a:r>
+          </a:p>
+        </p:txBody>
+      </p:sp>
+    </p:spTree>
+  </p:cSld>
+  <p:clrMapOvr>
+    <a:masterClrMapping/>
+  </p:clrMapOvr>
+</p:notes>
+</file>
+
+<file path=ppt/notesSlides/notesSlide10.xml><?xml version="1.0" encoding="utf-8"?>
+<p:notes xmlns:p="http://schemas.openxmlformats.org/presentationml/2006/main" xmlns:a="http://schemas.openxmlformats.org/drawingml/2006/main">
+  <p:cSld>
+    <p:spTree xmlns:r="http://schemas.openxmlformats.org/officeDocument/2006/relationships">
+      <p:nvGrpSpPr>
+        <p:cNvPr id="1" name=""/>
+        <p:cNvGrpSpPr/>
+        <p:nvPr/>
+      </p:nvGrpSpPr>
+      <p:grpSpPr>
+        <a:xfrm>
+          <a:off x="0" y="0"/>
+          <a:ext cx="0" cy="0"/>
+          <a:chOff x="0" y="0"/>
+          <a:chExt cx="0" cy="0"/>
+        </a:xfrm>
+      </p:grpSpPr>
+      <p:sp>
+        <p:nvSpPr>
+          <p:cNvPr id="2" name="Header Placeholder 1"/>
+          <p:cNvSpPr>
+            <a:spLocks noGrp="1"/>
+          </p:cNvSpPr>
+          <p:nvPr>
+            <p:ph type="hdr" sz="quarter"/>
+          </p:nvPr>
+        </p:nvSpPr>
+        <p:spPr>
+          <a:xfrm>
+            <a:off x="0" y="0"/>
+            <a:ext cx="3962400" cy="342900"/>
+          </a:xfrm>
+          <a:prstGeom prst="rect">
+            <a:avLst/>
+          </a:prstGeom>
+        </p:spPr>
+        <p:txBody>
+          <a:bodyPr vert="horz" lIns="91440" tIns="45720" rIns="91440" bIns="45720" rtlCol="0"/>
+          <a:lstStyle>
+            <a:lvl1pPr algn="l">
+              <a:defRPr sz="1200"/>
+            </a:lvl1pPr>
+          </a:lstStyle>
+          <a:p/>
+        </p:txBody>
+      </p:sp>
+      <p:sp>
+        <p:nvSpPr>
+          <p:cNvPr id="3" name="Date Placeholder 2"/>
+          <p:cNvSpPr>
+            <a:spLocks noGrp="1"/>
+          </p:cNvSpPr>
+          <p:nvPr>
+            <p:ph type="dt" idx="1"/>
+          </p:nvPr>
+        </p:nvSpPr>
+        <p:spPr>
+          <a:xfrm>
+            <a:off x="5180013" y="0"/>
+            <a:ext cx="3962400" cy="342900"/>
+          </a:xfrm>
+          <a:prstGeom prst="rect">
+            <a:avLst/>
+          </a:prstGeom>
+        </p:spPr>
+        <p:txBody>
+          <a:bodyPr vert="horz" lIns="91440" tIns="45720" rIns="91440" bIns="45720" rtlCol="0"/>
+          <a:lstStyle>
+            <a:lvl1pPr algn="r">
+              <a:defRPr sz="1200"/>
+            </a:lvl1pPr>
+          </a:lstStyle>
+          <a:p>
+            <a:r id="{B7268E1E-0E44-426D-905E-8AD9B19D2182}" type="datetimeFigureOut">
+              <a:rPr lang="cs-CZ" smtClean="0"/>
+              <a:t>1.7.2013</a:t>
+            </a:r>
+          </a:p>
+        </p:txBody>
+      </p:sp>
+      <p:sp>
+        <p:nvSpPr>
+          <p:cNvPr id="4" name="Slide Image Placeholder 3"/>
+          <p:cNvSpPr>
+            <a:spLocks noGrp="1" noRot="1" noChangeAspect="1"/>
+          </p:cNvSpPr>
+          <p:nvPr>
+            <p:ph type="sldImg" idx="2"/>
+          </p:nvPr>
+        </p:nvSpPr>
+        <p:spPr>
+          <a:xfrm>
+            <a:off x="2857500" y="512763"/>
+            <a:ext cx="3429000" cy="2566987"/>
+          </a:xfrm>
+          <a:prstGeom prst="rect">
+            <a:avLst/>
+          </a:prstGeom>
+          <a:noFill/>
+          <a:ln w="12700">
+            <a:solidFill>
+              <a:prstClr val="black"/>
+            </a:solidFill>
+          </a:ln>
+        </p:spPr>
+        <p:txBody>
+          <a:bodyPr vert="horz" lIns="91440" tIns="45720" rIns="91440" bIns="45720" rtlCol="0" anchor="ctr"/>
+          <a:lstStyle/>
+          <a:p/>
+        </p:txBody>
+      </p:sp>
+      <p:sp>
+        <p:nvSpPr>
+          <p:cNvPr id="5" name="Notes Placeholder 4"/>
+          <p:cNvSpPr>
+            <a:spLocks noGrp="1"/>
+          </p:cNvSpPr>
+          <p:nvPr>
+            <p:ph type="body" sz="quarter" idx="3"/>
+          </p:nvPr>
+        </p:nvSpPr>
+        <p:spPr>
+          <a:xfrm>
+            <a:off x="914400" y="3251200"/>
+            <a:ext cx="7315200" cy="3081338"/>
+          </a:xfrm>
+          <a:prstGeom prst="rect">
+            <a:avLst/>
+          </a:prstGeom>
+        </p:spPr>
+        <p:txBody>
+          <a:bodyPr vert="horz" lIns="91440" tIns="45720" rIns="91440" bIns="45720" rtlCol="0"/>
+          <a:lstStyle/>
+          <a:p>
+            <a:r>
+              <a:rPr lang="en-US"/>
+              <a:t>&lt;number&gt;</a:t>
+            </a:r>
+            <a:endParaRPr lang="en-US" smtClean="0"/>
+          </a:p>
+        </p:txBody>
+      </p:sp>
+      <p:sp>
+        <p:nvSpPr>
+          <p:cNvPr id="6" name="Footer Placeholder 5"/>
+          <p:cNvSpPr>
+            <a:spLocks noGrp="1"/>
+          </p:cNvSpPr>
+          <p:nvPr>
+            <p:ph type="ftr" sz="quarter" idx="4"/>
+          </p:nvPr>
+        </p:nvSpPr>
+        <p:spPr>
+          <a:xfrm>
+            <a:off x="0" y="6502400"/>
+            <a:ext cx="3962400" cy="341313"/>
+          </a:xfrm>
+          <a:prstGeom prst="rect">
+            <a:avLst/>
+          </a:prstGeom>
+        </p:spPr>
+        <p:txBody>
+          <a:bodyPr vert="horz" lIns="91440" tIns="45720" rIns="91440" bIns="45720" rtlCol="0" anchor="b"/>
+          <a:lstStyle>
+            <a:lvl1pPr algn="l">
+              <a:defRPr sz="1200"/>
+            </a:lvl1pPr>
+          </a:lstStyle>
+          <a:p/>
+        </p:txBody>
+      </p:sp>
+      <p:sp>
+        <p:nvSpPr>
+          <p:cNvPr id="7" name="Slide Number Placeholder 6"/>
+          <p:cNvSpPr>
+            <a:spLocks noGrp="1"/>
+          </p:cNvSpPr>
+          <p:nvPr>
+            <p:ph type="sldNum" sz="quarter" idx="5"/>
+          </p:nvPr>
+        </p:nvSpPr>
+        <p:spPr>
+          <a:xfrm>
+            <a:off x="5180013" y="6502400"/>
+            <a:ext cx="3962400" cy="341313"/>
+          </a:xfrm>
+          <a:prstGeom prst="rect">
+            <a:avLst/>
+          </a:prstGeom>
+        </p:spPr>
+        <p:txBody>
+          <a:bodyPr vert="horz" lIns="91440" tIns="45720" rIns="91440" bIns="45720" rtlCol="0" anchor="b"/>
+          <a:lstStyle>
+            <a:lvl1pPr algn="r">
+              <a:defRPr sz="1200"/>
+            </a:lvl1pPr>
+          </a:lstStyle>
+          <a:p>
+            <a:r id="{871B2431-D351-4C6E-A3CF-9DFAC0E3E050}" type="slidenum">
+              <a:rPr lang="cs-CZ" smtClean="0"/>
+              <a:t>‹#›</a:t>
+            </a:r>
+          </a:p>
+        </p:txBody>
+      </p:sp>
+    </p:spTree>
+  </p:cSld>
+  <p:clrMapOvr>
+    <a:masterClrMapping/>
+  </p:clrMapOvr>
+</p:notes>
+</file>
+
+<file path=ppt/notesSlides/notesSlide11.xml><?xml version="1.0" encoding="utf-8"?>
+<p:notes xmlns:p="http://schemas.openxmlformats.org/presentationml/2006/main" xmlns:a="http://schemas.openxmlformats.org/drawingml/2006/main">
+  <p:cSld>
+    <p:spTree xmlns:r="http://schemas.openxmlformats.org/officeDocument/2006/relationships">
+      <p:nvGrpSpPr>
+        <p:cNvPr id="1" name=""/>
+        <p:cNvGrpSpPr/>
+        <p:nvPr/>
+      </p:nvGrpSpPr>
+      <p:grpSpPr>
+        <a:xfrm>
+          <a:off x="0" y="0"/>
+          <a:ext cx="0" cy="0"/>
+          <a:chOff x="0" y="0"/>
+          <a:chExt cx="0" cy="0"/>
+        </a:xfrm>
+      </p:grpSpPr>
+      <p:sp>
+        <p:nvSpPr>
+          <p:cNvPr id="2" name="Header Placeholder 1"/>
+          <p:cNvSpPr>
+            <a:spLocks noGrp="1"/>
+          </p:cNvSpPr>
+          <p:nvPr>
+            <p:ph type="hdr" sz="quarter"/>
+          </p:nvPr>
+        </p:nvSpPr>
+        <p:spPr>
+          <a:xfrm>
+            <a:off x="0" y="0"/>
+            <a:ext cx="3962400" cy="342900"/>
+          </a:xfrm>
+          <a:prstGeom prst="rect">
+            <a:avLst/>
+          </a:prstGeom>
+        </p:spPr>
+        <p:txBody>
+          <a:bodyPr vert="horz" lIns="91440" tIns="45720" rIns="91440" bIns="45720" rtlCol="0"/>
+          <a:lstStyle>
+            <a:lvl1pPr algn="l">
+              <a:defRPr sz="1200"/>
+            </a:lvl1pPr>
+          </a:lstStyle>
+          <a:p/>
+        </p:txBody>
+      </p:sp>
+      <p:sp>
+        <p:nvSpPr>
+          <p:cNvPr id="3" name="Date Placeholder 2"/>
+          <p:cNvSpPr>
+            <a:spLocks noGrp="1"/>
+          </p:cNvSpPr>
+          <p:nvPr>
+            <p:ph type="dt" idx="1"/>
+          </p:nvPr>
+        </p:nvSpPr>
+        <p:spPr>
+          <a:xfrm>
+            <a:off x="5180013" y="0"/>
+            <a:ext cx="3962400" cy="342900"/>
+          </a:xfrm>
+          <a:prstGeom prst="rect">
+            <a:avLst/>
+          </a:prstGeom>
+        </p:spPr>
+        <p:txBody>
+          <a:bodyPr vert="horz" lIns="91440" tIns="45720" rIns="91440" bIns="45720" rtlCol="0"/>
+          <a:lstStyle>
+            <a:lvl1pPr algn="r">
+              <a:defRPr sz="1200"/>
+            </a:lvl1pPr>
+          </a:lstStyle>
+          <a:p>
+            <a:r id="{B7268E1E-0E44-426D-905E-8AD9B19D2182}" type="datetimeFigureOut">
+              <a:rPr lang="cs-CZ" smtClean="0"/>
+              <a:t>1.7.2013</a:t>
+            </a:r>
+          </a:p>
+        </p:txBody>
+      </p:sp>
+      <p:sp>
+        <p:nvSpPr>
+          <p:cNvPr id="4" name="Slide Image Placeholder 3"/>
+          <p:cNvSpPr>
+            <a:spLocks noGrp="1" noRot="1" noChangeAspect="1"/>
+          </p:cNvSpPr>
+          <p:nvPr>
+            <p:ph type="sldImg" idx="2"/>
+          </p:nvPr>
+        </p:nvSpPr>
+        <p:spPr>
+          <a:xfrm>
+            <a:off x="2857500" y="512763"/>
+            <a:ext cx="3429000" cy="2566987"/>
+          </a:xfrm>
+          <a:prstGeom prst="rect">
+            <a:avLst/>
+          </a:prstGeom>
+          <a:noFill/>
+          <a:ln w="12700">
+            <a:solidFill>
+              <a:prstClr val="black"/>
+            </a:solidFill>
+          </a:ln>
+        </p:spPr>
+        <p:txBody>
+          <a:bodyPr vert="horz" lIns="91440" tIns="45720" rIns="91440" bIns="45720" rtlCol="0" anchor="ctr"/>
+          <a:lstStyle/>
+          <a:p/>
+        </p:txBody>
+      </p:sp>
+      <p:sp>
+        <p:nvSpPr>
+          <p:cNvPr id="5" name="Notes Placeholder 4"/>
+          <p:cNvSpPr>
+            <a:spLocks noGrp="1"/>
+          </p:cNvSpPr>
+          <p:nvPr>
+            <p:ph type="body" sz="quarter" idx="3"/>
+          </p:nvPr>
+        </p:nvSpPr>
+        <p:spPr>
+          <a:xfrm>
+            <a:off x="914400" y="3251200"/>
+            <a:ext cx="7315200" cy="3081338"/>
+          </a:xfrm>
+          <a:prstGeom prst="rect">
+            <a:avLst/>
+          </a:prstGeom>
+        </p:spPr>
+        <p:txBody>
+          <a:bodyPr vert="horz" lIns="91440" tIns="45720" rIns="91440" bIns="45720" rtlCol="0"/>
+          <a:lstStyle/>
+          <a:p>
+            <a:r>
+              <a:rPr lang="en-US"/>
+              <a:t>&lt;number&gt;</a:t>
+            </a:r>
+            <a:endParaRPr lang="en-US" smtClean="0"/>
+          </a:p>
+        </p:txBody>
+      </p:sp>
+      <p:sp>
+        <p:nvSpPr>
+          <p:cNvPr id="6" name="Footer Placeholder 5"/>
+          <p:cNvSpPr>
+            <a:spLocks noGrp="1"/>
+          </p:cNvSpPr>
+          <p:nvPr>
+            <p:ph type="ftr" sz="quarter" idx="4"/>
+          </p:nvPr>
+        </p:nvSpPr>
+        <p:spPr>
+          <a:xfrm>
+            <a:off x="0" y="6502400"/>
+            <a:ext cx="3962400" cy="341313"/>
+          </a:xfrm>
+          <a:prstGeom prst="rect">
+            <a:avLst/>
+          </a:prstGeom>
+        </p:spPr>
+        <p:txBody>
+          <a:bodyPr vert="horz" lIns="91440" tIns="45720" rIns="91440" bIns="45720" rtlCol="0" anchor="b"/>
+          <a:lstStyle>
+            <a:lvl1pPr algn="l">
+              <a:defRPr sz="1200"/>
+            </a:lvl1pPr>
+          </a:lstStyle>
+          <a:p/>
+        </p:txBody>
+      </p:sp>
+      <p:sp>
+        <p:nvSpPr>
+          <p:cNvPr id="7" name="Slide Number Placeholder 6"/>
+          <p:cNvSpPr>
+            <a:spLocks noGrp="1"/>
+          </p:cNvSpPr>
+          <p:nvPr>
+            <p:ph type="sldNum" sz="quarter" idx="5"/>
+          </p:nvPr>
+        </p:nvSpPr>
+        <p:spPr>
+          <a:xfrm>
+            <a:off x="5180013" y="6502400"/>
+            <a:ext cx="3962400" cy="341313"/>
+          </a:xfrm>
+          <a:prstGeom prst="rect">
+            <a:avLst/>
+          </a:prstGeom>
+        </p:spPr>
+        <p:txBody>
+          <a:bodyPr vert="horz" lIns="91440" tIns="45720" rIns="91440" bIns="45720" rtlCol="0" anchor="b"/>
+          <a:lstStyle>
+            <a:lvl1pPr algn="r">
+              <a:defRPr sz="1200"/>
+            </a:lvl1pPr>
+          </a:lstStyle>
+          <a:p>
+            <a:r id="{871B2431-D351-4C6E-A3CF-9DFAC0E3E050}" type="slidenum">
+              <a:rPr lang="cs-CZ" smtClean="0"/>
+              <a:t>‹#›</a:t>
+            </a:r>
+          </a:p>
+        </p:txBody>
+      </p:sp>
+    </p:spTree>
+  </p:cSld>
+  <p:clrMapOvr>
+    <a:masterClrMapping/>
+  </p:clrMapOvr>
+</p:notes>
+</file>
+
+<file path=ppt/notesSlides/notesSlide12.xml><?xml version="1.0" encoding="utf-8"?>
 <p:notes xmlns:p="http://schemas.openxmlformats.org/presentationml/2006/main" xmlns:a="http://schemas.openxmlformats.org/drawingml/2006/main">
   <p:cSld>
     <p:spTree xmlns:r="http://schemas.openxmlformats.org/officeDocument/2006/relationships">
@@ -5337,6 +5979,25 @@
 <file path=ppt/slides/slide1.xml><?xml version="1.0" encoding="utf-8"?>
 <p:sld xmlns:p="http://schemas.openxmlformats.org/presentationml/2006/main" xmlns:a="http://schemas.openxmlformats.org/drawingml/2006/main" xmlns:r="http://schemas.openxmlformats.org/officeDocument/2006/relationships">
   <p:cSld>
+    <p:bg>
+      <p:bgPr>
+        <a:gradFill rotWithShape="true">
+          <a:gsLst>
+            <a:gs pos="0">
+              <a:srgbClr val="E9F0F3">
+                <a:alpha val="100000"/>
+              </a:srgbClr>
+            </a:gs>
+            <a:gs pos="100000">
+              <a:srgbClr val="A2A5AC">
+                <a:alpha val="100000"/>
+              </a:srgbClr>
+            </a:gs>
+          </a:gsLst>
+          <a:lin ang="5400000"/>
+        </a:gradFill>
+      </p:bgPr>
+    </p:bg>
     <p:spTree>
       <p:nvGrpSpPr>
         <p:cNvPr id="1" name=""/>
@@ -5532,9 +6193,9 @@
         <p:grpSpPr>
           <a:xfrm rot="0">
             <a:off x="349109" y="3609673"/>
-            <a:ext cx="8787722" cy="968018"/>
+            <a:ext cx="8996978" cy="767273"/>
             <a:chOff x="0" y="0"/>
-            <a:chExt cx="11716963" cy="1290690"/>
+            <a:chExt cx="11995971" cy="1023031"/>
           </a:xfrm>
         </p:grpSpPr>
         <p:sp>
@@ -5546,7 +6207,7 @@
           <p:spPr>
             <a:xfrm flipH="false" flipV="false" rot="0">
               <a:off x="0" y="0"/>
-              <a:ext cx="11716962" cy="1290690"/>
+              <a:ext cx="11995971" cy="1023031"/>
             </a:xfrm>
             <a:custGeom>
               <a:avLst/>
@@ -5555,18 +6216,18 @@
               <a:cxnLst/>
               <a:rect r="r" b="b" t="t" l="l"/>
               <a:pathLst>
-                <a:path h="1290690" w="11716962">
+                <a:path h="1023031" w="11995971">
                   <a:moveTo>
                     <a:pt x="0" y="0"/>
                   </a:moveTo>
                   <a:lnTo>
-                    <a:pt x="11716962" y="0"/>
+                    <a:pt x="11995971" y="0"/>
                   </a:lnTo>
                   <a:lnTo>
-                    <a:pt x="11716962" y="1290690"/>
+                    <a:pt x="11995971" y="1023031"/>
                   </a:lnTo>
                   <a:lnTo>
-                    <a:pt x="0" y="1290690"/>
+                    <a:pt x="0" y="1023031"/>
                   </a:lnTo>
                   <a:close/>
                 </a:path>
@@ -5588,7 +6249,7 @@
           <p:spPr>
             <a:xfrm>
               <a:off x="0" y="-19050"/>
-              <a:ext cx="11716963" cy="1309740"/>
+              <a:ext cx="11995971" cy="1042081"/>
             </a:xfrm>
             <a:prstGeom prst="rect">
               <a:avLst/>
@@ -5614,25 +6275,6 @@
                   <a:sym typeface="Arial"/>
                 </a:rPr>
                 <a:t>LICENCIAMENTO DE SOFTWARE</a:t>
-              </a:r>
-            </a:p>
-            <a:p>
-              <a:pPr algn="ctr">
-                <a:lnSpc>
-                  <a:spcPts val="3255"/>
-                </a:lnSpc>
-              </a:pPr>
-              <a:r>
-                <a:rPr lang="en-US" sz="2712">
-                  <a:solidFill>
-                    <a:srgbClr val="000000"/>
-                  </a:solidFill>
-                  <a:latin typeface="Arial"/>
-                  <a:ea typeface="Arial"/>
-                  <a:cs typeface="Arial"/>
-                  <a:sym typeface="Arial"/>
-                </a:rPr>
-                <a:t>(NO MAXIMO DUAS LINHAS, REDUZIR PARA CABER)</a:t>
               </a:r>
             </a:p>
           </p:txBody>
@@ -5824,7 +6466,7 @@
                   <a:cs typeface="Arial"/>
                   <a:sym typeface="Arial"/>
                 </a:rPr>
-                <a:t>JUNDIAÍ</a:t>
+                <a:t>JUNDIAÍ-SP</a:t>
               </a:r>
             </a:p>
             <a:p>
@@ -5983,1611 +6625,28 @@
 </p:sld>
 </file>
 
-<file path=ppt/slides/slide2.xml><?xml version="1.0" encoding="utf-8"?>
-<p:sld xmlns:p="http://schemas.openxmlformats.org/presentationml/2006/main" xmlns:a="http://schemas.openxmlformats.org/drawingml/2006/main" xmlns:r="http://schemas.openxmlformats.org/officeDocument/2006/relationships">
+<file path=ppt/slides/slide10.xml><?xml version="1.0" encoding="utf-8"?>
+<p:sld xmlns:p="http://schemas.openxmlformats.org/presentationml/2006/main" xmlns:a="http://schemas.openxmlformats.org/drawingml/2006/main">
   <p:cSld>
     <p:bg>
       <p:bgPr>
-        <a:solidFill>
-          <a:srgbClr val="130150"/>
-        </a:solidFill>
+        <a:gradFill rotWithShape="true">
+          <a:gsLst>
+            <a:gs pos="0">
+              <a:srgbClr val="E9F0F3">
+                <a:alpha val="100000"/>
+              </a:srgbClr>
+            </a:gs>
+            <a:gs pos="100000">
+              <a:srgbClr val="A2A5AC">
+                <a:alpha val="100000"/>
+              </a:srgbClr>
+            </a:gs>
+          </a:gsLst>
+          <a:lin ang="5400000"/>
+        </a:gradFill>
       </p:bgPr>
     </p:bg>
-    <p:spTree>
-      <p:nvGrpSpPr>
-        <p:cNvPr id="1" name=""/>
-        <p:cNvGrpSpPr/>
-        <p:nvPr/>
-      </p:nvGrpSpPr>
-      <p:grpSpPr>
-        <a:xfrm>
-          <a:off x="0" y="0"/>
-          <a:ext cx="0" cy="0"/>
-          <a:chOff x="0" y="0"/>
-          <a:chExt cx="0" cy="0"/>
-        </a:xfrm>
-      </p:grpSpPr>
-      <p:sp>
-        <p:nvSpPr>
-          <p:cNvPr name="Freeform 2" id="2"/>
-          <p:cNvSpPr/>
-          <p:nvPr/>
-        </p:nvSpPr>
-        <p:spPr>
-          <a:xfrm flipH="false" flipV="false" rot="0">
-            <a:off x="487567" y="3990406"/>
-            <a:ext cx="5461184" cy="2880819"/>
-          </a:xfrm>
-          <a:custGeom>
-            <a:avLst/>
-            <a:gdLst/>
-            <a:ahLst/>
-            <a:cxnLst/>
-            <a:rect r="r" b="b" t="t" l="l"/>
-            <a:pathLst>
-              <a:path h="2880819" w="5461184">
-                <a:moveTo>
-                  <a:pt x="0" y="0"/>
-                </a:moveTo>
-                <a:lnTo>
-                  <a:pt x="5461184" y="0"/>
-                </a:lnTo>
-                <a:lnTo>
-                  <a:pt x="5461184" y="2880819"/>
-                </a:lnTo>
-                <a:lnTo>
-                  <a:pt x="0" y="2880819"/>
-                </a:lnTo>
-                <a:lnTo>
-                  <a:pt x="0" y="0"/>
-                </a:lnTo>
-                <a:close/>
-              </a:path>
-            </a:pathLst>
-          </a:custGeom>
-          <a:blipFill>
-            <a:blip r:embed="rId3"/>
-            <a:stretch>
-              <a:fillRect l="0" t="0" r="0" b="0"/>
-            </a:stretch>
-          </a:blipFill>
-        </p:spPr>
-      </p:sp>
-      <p:grpSp>
-        <p:nvGrpSpPr>
-          <p:cNvPr name="Group 3" id="3"/>
-          <p:cNvGrpSpPr/>
-          <p:nvPr/>
-        </p:nvGrpSpPr>
-        <p:grpSpPr>
-          <a:xfrm rot="0">
-            <a:off x="487567" y="292261"/>
-            <a:ext cx="8787722" cy="822726"/>
-            <a:chOff x="0" y="0"/>
-            <a:chExt cx="11716963" cy="1096968"/>
-          </a:xfrm>
-        </p:grpSpPr>
-        <p:sp>
-          <p:nvSpPr>
-            <p:cNvPr name="Freeform 4" id="4"/>
-            <p:cNvSpPr/>
-            <p:nvPr/>
-          </p:nvSpPr>
-          <p:spPr>
-            <a:xfrm flipH="false" flipV="false" rot="0">
-              <a:off x="0" y="0"/>
-              <a:ext cx="11716962" cy="1096969"/>
-            </a:xfrm>
-            <a:custGeom>
-              <a:avLst/>
-              <a:gdLst/>
-              <a:ahLst/>
-              <a:cxnLst/>
-              <a:rect r="r" b="b" t="t" l="l"/>
-              <a:pathLst>
-                <a:path h="1096969" w="11716962">
-                  <a:moveTo>
-                    <a:pt x="0" y="0"/>
-                  </a:moveTo>
-                  <a:lnTo>
-                    <a:pt x="11716962" y="0"/>
-                  </a:lnTo>
-                  <a:lnTo>
-                    <a:pt x="11716962" y="1096969"/>
-                  </a:lnTo>
-                  <a:lnTo>
-                    <a:pt x="0" y="1096969"/>
-                  </a:lnTo>
-                  <a:close/>
-                </a:path>
-              </a:pathLst>
-            </a:custGeom>
-            <a:solidFill>
-              <a:srgbClr val="000000">
-                <a:alpha val="0"/>
-              </a:srgbClr>
-            </a:solidFill>
-          </p:spPr>
-        </p:sp>
-        <p:sp>
-          <p:nvSpPr>
-            <p:cNvPr name="TextBox 5" id="5"/>
-            <p:cNvSpPr txBox="true"/>
-            <p:nvPr/>
-          </p:nvSpPr>
-          <p:spPr>
-            <a:xfrm>
-              <a:off x="0" y="-19050"/>
-              <a:ext cx="11716963" cy="1116018"/>
-            </a:xfrm>
-            <a:prstGeom prst="rect">
-              <a:avLst/>
-            </a:prstGeom>
-          </p:spPr>
-          <p:txBody>
-            <a:bodyPr anchor="ctr" rtlCol="false" tIns="0" lIns="0" bIns="0" rIns="0"/>
-            <a:lstStyle/>
-            <a:p>
-              <a:pPr algn="ctr">
-                <a:lnSpc>
-                  <a:spcPts val="2092"/>
-                </a:lnSpc>
-              </a:pPr>
-              <a:r>
-                <a:rPr lang="en-US" sz="1743">
-                  <a:solidFill>
-                    <a:srgbClr val="000000"/>
-                  </a:solidFill>
-                  <a:latin typeface="Arial"/>
-                  <a:ea typeface="Arial"/>
-                  <a:cs typeface="Arial"/>
-                  <a:sym typeface="Arial"/>
-                </a:rPr>
-                <a:t>INTRODUÇÃO</a:t>
-              </a:r>
-            </a:p>
-          </p:txBody>
-        </p:sp>
-      </p:grpSp>
-      <p:grpSp>
-        <p:nvGrpSpPr>
-          <p:cNvPr name="Group 6" id="6"/>
-          <p:cNvGrpSpPr/>
-          <p:nvPr/>
-        </p:nvGrpSpPr>
-        <p:grpSpPr>
-          <a:xfrm rot="0">
-            <a:off x="487567" y="292261"/>
-            <a:ext cx="8787722" cy="822726"/>
-            <a:chOff x="0" y="0"/>
-            <a:chExt cx="11716963" cy="1096968"/>
-          </a:xfrm>
-        </p:grpSpPr>
-        <p:sp>
-          <p:nvSpPr>
-            <p:cNvPr name="Freeform 7" id="7"/>
-            <p:cNvSpPr/>
-            <p:nvPr/>
-          </p:nvSpPr>
-          <p:spPr>
-            <a:xfrm flipH="false" flipV="false" rot="0">
-              <a:off x="0" y="0"/>
-              <a:ext cx="11716962" cy="1096969"/>
-            </a:xfrm>
-            <a:custGeom>
-              <a:avLst/>
-              <a:gdLst/>
-              <a:ahLst/>
-              <a:cxnLst/>
-              <a:rect r="r" b="b" t="t" l="l"/>
-              <a:pathLst>
-                <a:path h="1096969" w="11716962">
-                  <a:moveTo>
-                    <a:pt x="0" y="0"/>
-                  </a:moveTo>
-                  <a:lnTo>
-                    <a:pt x="11716962" y="0"/>
-                  </a:lnTo>
-                  <a:lnTo>
-                    <a:pt x="11716962" y="1096969"/>
-                  </a:lnTo>
-                  <a:lnTo>
-                    <a:pt x="0" y="1096969"/>
-                  </a:lnTo>
-                  <a:close/>
-                </a:path>
-              </a:pathLst>
-            </a:custGeom>
-            <a:solidFill>
-              <a:srgbClr val="000000">
-                <a:alpha val="0"/>
-              </a:srgbClr>
-            </a:solidFill>
-          </p:spPr>
-        </p:sp>
-        <p:sp>
-          <p:nvSpPr>
-            <p:cNvPr name="TextBox 8" id="8"/>
-            <p:cNvSpPr txBox="true"/>
-            <p:nvPr/>
-          </p:nvSpPr>
-          <p:spPr>
-            <a:xfrm>
-              <a:off x="0" y="-19050"/>
-              <a:ext cx="11716963" cy="1116018"/>
-            </a:xfrm>
-            <a:prstGeom prst="rect">
-              <a:avLst/>
-            </a:prstGeom>
-          </p:spPr>
-          <p:txBody>
-            <a:bodyPr anchor="ctr" rtlCol="false" tIns="0" lIns="0" bIns="0" rIns="0"/>
-            <a:lstStyle/>
-            <a:p>
-              <a:pPr algn="ctr">
-                <a:lnSpc>
-                  <a:spcPts val="2092"/>
-                </a:lnSpc>
-              </a:pPr>
-              <a:r>
-                <a:rPr lang="en-US" sz="1743">
-                  <a:solidFill>
-                    <a:srgbClr val="000000"/>
-                  </a:solidFill>
-                  <a:latin typeface="Arial"/>
-                  <a:ea typeface="Arial"/>
-                  <a:cs typeface="Arial"/>
-                  <a:sym typeface="Arial"/>
-                </a:rPr>
-                <a:t>INTRODUÇÃO</a:t>
-              </a:r>
-            </a:p>
-          </p:txBody>
-        </p:sp>
-      </p:grpSp>
-      <p:grpSp>
-        <p:nvGrpSpPr>
-          <p:cNvPr name="Group 9" id="9"/>
-          <p:cNvGrpSpPr/>
-          <p:nvPr/>
-        </p:nvGrpSpPr>
-        <p:grpSpPr>
-          <a:xfrm rot="0">
-            <a:off x="0" y="292261"/>
-            <a:ext cx="9753600" cy="913154"/>
-            <a:chOff x="0" y="0"/>
-            <a:chExt cx="11716963" cy="1096968"/>
-          </a:xfrm>
-        </p:grpSpPr>
-        <p:sp>
-          <p:nvSpPr>
-            <p:cNvPr name="Freeform 10" id="10"/>
-            <p:cNvSpPr/>
-            <p:nvPr/>
-          </p:nvSpPr>
-          <p:spPr>
-            <a:xfrm flipH="false" flipV="false" rot="0">
-              <a:off x="0" y="0"/>
-              <a:ext cx="11716962" cy="1096969"/>
-            </a:xfrm>
-            <a:custGeom>
-              <a:avLst/>
-              <a:gdLst/>
-              <a:ahLst/>
-              <a:cxnLst/>
-              <a:rect r="r" b="b" t="t" l="l"/>
-              <a:pathLst>
-                <a:path h="1096969" w="11716962">
-                  <a:moveTo>
-                    <a:pt x="0" y="0"/>
-                  </a:moveTo>
-                  <a:lnTo>
-                    <a:pt x="11716962" y="0"/>
-                  </a:lnTo>
-                  <a:lnTo>
-                    <a:pt x="11716962" y="1096969"/>
-                  </a:lnTo>
-                  <a:lnTo>
-                    <a:pt x="0" y="1096969"/>
-                  </a:lnTo>
-                  <a:close/>
-                </a:path>
-              </a:pathLst>
-            </a:custGeom>
-            <a:solidFill>
-              <a:srgbClr val="000000">
-                <a:alpha val="0"/>
-              </a:srgbClr>
-            </a:solidFill>
-          </p:spPr>
-        </p:sp>
-        <p:sp>
-          <p:nvSpPr>
-            <p:cNvPr name="TextBox 11" id="11"/>
-            <p:cNvSpPr txBox="true"/>
-            <p:nvPr/>
-          </p:nvSpPr>
-          <p:spPr>
-            <a:xfrm>
-              <a:off x="0" y="-19050"/>
-              <a:ext cx="11716963" cy="1116018"/>
-            </a:xfrm>
-            <a:prstGeom prst="rect">
-              <a:avLst/>
-            </a:prstGeom>
-          </p:spPr>
-          <p:txBody>
-            <a:bodyPr anchor="ctr" rtlCol="false" tIns="0" lIns="0" bIns="0" rIns="0"/>
-            <a:lstStyle/>
-            <a:p>
-              <a:pPr algn="ctr">
-                <a:lnSpc>
-                  <a:spcPts val="2092"/>
-                </a:lnSpc>
-              </a:pPr>
-              <a:r>
-                <a:rPr lang="en-US" sz="1743">
-                  <a:solidFill>
-                    <a:srgbClr val="FFFFFF"/>
-                  </a:solidFill>
-                  <a:latin typeface="Arial"/>
-                  <a:ea typeface="Arial"/>
-                  <a:cs typeface="Arial"/>
-                  <a:sym typeface="Arial"/>
-                </a:rPr>
-                <a:t>INTRODUÇÃO</a:t>
-              </a:r>
-            </a:p>
-          </p:txBody>
-        </p:sp>
-      </p:grpSp>
-      <p:sp>
-        <p:nvSpPr>
-          <p:cNvPr name="TextBox 12" id="12"/>
-          <p:cNvSpPr txBox="true"/>
-          <p:nvPr/>
-        </p:nvSpPr>
-        <p:spPr>
-          <a:xfrm rot="0">
-            <a:off x="487567" y="1703587"/>
-            <a:ext cx="8787722" cy="2124075"/>
-          </a:xfrm>
-          <a:prstGeom prst="rect">
-            <a:avLst/>
-          </a:prstGeom>
-        </p:spPr>
-        <p:txBody>
-          <a:bodyPr anchor="t" rtlCol="false" tIns="0" lIns="0" bIns="0" rIns="0">
-            <a:spAutoFit/>
-          </a:bodyPr>
-          <a:lstStyle/>
-          <a:p>
-            <a:pPr algn="just">
-              <a:lnSpc>
-                <a:spcPts val="2790"/>
-              </a:lnSpc>
-            </a:pPr>
-            <a:r>
-              <a:rPr lang="en-US" sz="2325">
-                <a:solidFill>
-                  <a:srgbClr val="FFFFFF"/>
-                </a:solidFill>
-                <a:latin typeface="Arial"/>
-                <a:ea typeface="Arial"/>
-                <a:cs typeface="Arial"/>
-                <a:sym typeface="Arial"/>
-              </a:rPr>
-              <a:t>O licenciamento de software é uma parte muito presente no ordinário de quase todos, mesmo quando não se percebe. Sempre que é instalado um programa ou é aceitado um contrato de “termos de uso”, o usuário está diante de diferentes formas de regular o acesso, a distribuição e a modificação desse software.</a:t>
-            </a:r>
-          </a:p>
-          <a:p>
-            <a:pPr algn="just">
-              <a:lnSpc>
-                <a:spcPts val="2790"/>
-              </a:lnSpc>
-            </a:pPr>
-          </a:p>
-        </p:txBody>
-      </p:sp>
-    </p:spTree>
-  </p:cSld>
-  <p:clrMapOvr>
-    <a:masterClrMapping/>
-  </p:clrMapOvr>
-</p:sld>
-</file>
-
-<file path=ppt/slides/slide3.xml><?xml version="1.0" encoding="utf-8"?>
-<p:sld xmlns:p="http://schemas.openxmlformats.org/presentationml/2006/main" xmlns:a="http://schemas.openxmlformats.org/drawingml/2006/main" xmlns:r="http://schemas.openxmlformats.org/officeDocument/2006/relationships">
-  <p:cSld>
-    <p:spTree>
-      <p:nvGrpSpPr>
-        <p:cNvPr id="1" name=""/>
-        <p:cNvGrpSpPr/>
-        <p:nvPr/>
-      </p:nvGrpSpPr>
-      <p:grpSpPr>
-        <a:xfrm>
-          <a:off x="0" y="0"/>
-          <a:ext cx="0" cy="0"/>
-          <a:chOff x="0" y="0"/>
-          <a:chExt cx="0" cy="0"/>
-        </a:xfrm>
-      </p:grpSpPr>
-      <p:grpSp>
-        <p:nvGrpSpPr>
-          <p:cNvPr name="Group 2" id="2"/>
-          <p:cNvGrpSpPr/>
-          <p:nvPr/>
-        </p:nvGrpSpPr>
-        <p:grpSpPr>
-          <a:xfrm rot="0">
-            <a:off x="487567" y="292261"/>
-            <a:ext cx="8787722" cy="822726"/>
-            <a:chOff x="0" y="0"/>
-            <a:chExt cx="11716963" cy="1096968"/>
-          </a:xfrm>
-        </p:grpSpPr>
-        <p:sp>
-          <p:nvSpPr>
-            <p:cNvPr name="Freeform 3" id="3"/>
-            <p:cNvSpPr/>
-            <p:nvPr/>
-          </p:nvSpPr>
-          <p:spPr>
-            <a:xfrm flipH="false" flipV="false" rot="0">
-              <a:off x="0" y="0"/>
-              <a:ext cx="11716962" cy="1096969"/>
-            </a:xfrm>
-            <a:custGeom>
-              <a:avLst/>
-              <a:gdLst/>
-              <a:ahLst/>
-              <a:cxnLst/>
-              <a:rect r="r" b="b" t="t" l="l"/>
-              <a:pathLst>
-                <a:path h="1096969" w="11716962">
-                  <a:moveTo>
-                    <a:pt x="0" y="0"/>
-                  </a:moveTo>
-                  <a:lnTo>
-                    <a:pt x="11716962" y="0"/>
-                  </a:lnTo>
-                  <a:lnTo>
-                    <a:pt x="11716962" y="1096969"/>
-                  </a:lnTo>
-                  <a:lnTo>
-                    <a:pt x="0" y="1096969"/>
-                  </a:lnTo>
-                  <a:close/>
-                </a:path>
-              </a:pathLst>
-            </a:custGeom>
-            <a:solidFill>
-              <a:srgbClr val="000000">
-                <a:alpha val="0"/>
-              </a:srgbClr>
-            </a:solidFill>
-          </p:spPr>
-        </p:sp>
-        <p:sp>
-          <p:nvSpPr>
-            <p:cNvPr name="TextBox 4" id="4"/>
-            <p:cNvSpPr txBox="true"/>
-            <p:nvPr/>
-          </p:nvSpPr>
-          <p:spPr>
-            <a:xfrm>
-              <a:off x="0" y="-19050"/>
-              <a:ext cx="11716963" cy="1116018"/>
-            </a:xfrm>
-            <a:prstGeom prst="rect">
-              <a:avLst/>
-            </a:prstGeom>
-          </p:spPr>
-          <p:txBody>
-            <a:bodyPr anchor="ctr" rtlCol="false" tIns="0" lIns="0" bIns="0" rIns="0"/>
-            <a:lstStyle/>
-            <a:p>
-              <a:pPr algn="ctr">
-                <a:lnSpc>
-                  <a:spcPts val="2092"/>
-                </a:lnSpc>
-              </a:pPr>
-              <a:r>
-                <a:rPr lang="en-US" sz="1743">
-                  <a:solidFill>
-                    <a:srgbClr val="000000"/>
-                  </a:solidFill>
-                  <a:latin typeface="Arial"/>
-                  <a:ea typeface="Arial"/>
-                  <a:cs typeface="Arial"/>
-                  <a:sym typeface="Arial"/>
-                </a:rPr>
-                <a:t>INTRODUÇÃO</a:t>
-              </a:r>
-            </a:p>
-          </p:txBody>
-        </p:sp>
-      </p:grpSp>
-      <p:grpSp>
-        <p:nvGrpSpPr>
-          <p:cNvPr name="Group 5" id="5"/>
-          <p:cNvGrpSpPr/>
-          <p:nvPr/>
-        </p:nvGrpSpPr>
-        <p:grpSpPr>
-          <a:xfrm rot="0">
-            <a:off x="487567" y="292261"/>
-            <a:ext cx="8787722" cy="822726"/>
-            <a:chOff x="0" y="0"/>
-            <a:chExt cx="11716963" cy="1096968"/>
-          </a:xfrm>
-        </p:grpSpPr>
-        <p:sp>
-          <p:nvSpPr>
-            <p:cNvPr name="Freeform 6" id="6"/>
-            <p:cNvSpPr/>
-            <p:nvPr/>
-          </p:nvSpPr>
-          <p:spPr>
-            <a:xfrm flipH="false" flipV="false" rot="0">
-              <a:off x="0" y="0"/>
-              <a:ext cx="11716962" cy="1096969"/>
-            </a:xfrm>
-            <a:custGeom>
-              <a:avLst/>
-              <a:gdLst/>
-              <a:ahLst/>
-              <a:cxnLst/>
-              <a:rect r="r" b="b" t="t" l="l"/>
-              <a:pathLst>
-                <a:path h="1096969" w="11716962">
-                  <a:moveTo>
-                    <a:pt x="0" y="0"/>
-                  </a:moveTo>
-                  <a:lnTo>
-                    <a:pt x="11716962" y="0"/>
-                  </a:lnTo>
-                  <a:lnTo>
-                    <a:pt x="11716962" y="1096969"/>
-                  </a:lnTo>
-                  <a:lnTo>
-                    <a:pt x="0" y="1096969"/>
-                  </a:lnTo>
-                  <a:close/>
-                </a:path>
-              </a:pathLst>
-            </a:custGeom>
-            <a:solidFill>
-              <a:srgbClr val="000000">
-                <a:alpha val="0"/>
-              </a:srgbClr>
-            </a:solidFill>
-          </p:spPr>
-        </p:sp>
-        <p:sp>
-          <p:nvSpPr>
-            <p:cNvPr name="TextBox 7" id="7"/>
-            <p:cNvSpPr txBox="true"/>
-            <p:nvPr/>
-          </p:nvSpPr>
-          <p:spPr>
-            <a:xfrm>
-              <a:off x="0" y="-19050"/>
-              <a:ext cx="11716963" cy="1116018"/>
-            </a:xfrm>
-            <a:prstGeom prst="rect">
-              <a:avLst/>
-            </a:prstGeom>
-          </p:spPr>
-          <p:txBody>
-            <a:bodyPr anchor="ctr" rtlCol="false" tIns="0" lIns="0" bIns="0" rIns="0"/>
-            <a:lstStyle/>
-            <a:p>
-              <a:pPr algn="ctr">
-                <a:lnSpc>
-                  <a:spcPts val="2092"/>
-                </a:lnSpc>
-              </a:pPr>
-              <a:r>
-                <a:rPr lang="en-US" sz="1743">
-                  <a:solidFill>
-                    <a:srgbClr val="000000"/>
-                  </a:solidFill>
-                  <a:latin typeface="Arial"/>
-                  <a:ea typeface="Arial"/>
-                  <a:cs typeface="Arial"/>
-                  <a:sym typeface="Arial"/>
-                </a:rPr>
-                <a:t>INTRODUÇÃO</a:t>
-              </a:r>
-            </a:p>
-          </p:txBody>
-        </p:sp>
-      </p:grpSp>
-      <p:grpSp>
-        <p:nvGrpSpPr>
-          <p:cNvPr name="Group 8" id="8"/>
-          <p:cNvGrpSpPr/>
-          <p:nvPr/>
-        </p:nvGrpSpPr>
-        <p:grpSpPr>
-          <a:xfrm rot="0">
-            <a:off x="487567" y="292261"/>
-            <a:ext cx="8787722" cy="822726"/>
-            <a:chOff x="0" y="0"/>
-            <a:chExt cx="11716963" cy="1096968"/>
-          </a:xfrm>
-        </p:grpSpPr>
-        <p:sp>
-          <p:nvSpPr>
-            <p:cNvPr name="Freeform 9" id="9"/>
-            <p:cNvSpPr/>
-            <p:nvPr/>
-          </p:nvSpPr>
-          <p:spPr>
-            <a:xfrm flipH="false" flipV="false" rot="0">
-              <a:off x="0" y="0"/>
-              <a:ext cx="11716962" cy="1096969"/>
-            </a:xfrm>
-            <a:custGeom>
-              <a:avLst/>
-              <a:gdLst/>
-              <a:ahLst/>
-              <a:cxnLst/>
-              <a:rect r="r" b="b" t="t" l="l"/>
-              <a:pathLst>
-                <a:path h="1096969" w="11716962">
-                  <a:moveTo>
-                    <a:pt x="0" y="0"/>
-                  </a:moveTo>
-                  <a:lnTo>
-                    <a:pt x="11716962" y="0"/>
-                  </a:lnTo>
-                  <a:lnTo>
-                    <a:pt x="11716962" y="1096969"/>
-                  </a:lnTo>
-                  <a:lnTo>
-                    <a:pt x="0" y="1096969"/>
-                  </a:lnTo>
-                  <a:close/>
-                </a:path>
-              </a:pathLst>
-            </a:custGeom>
-            <a:solidFill>
-              <a:srgbClr val="000000">
-                <a:alpha val="0"/>
-              </a:srgbClr>
-            </a:solidFill>
-          </p:spPr>
-        </p:sp>
-        <p:sp>
-          <p:nvSpPr>
-            <p:cNvPr name="TextBox 10" id="10"/>
-            <p:cNvSpPr txBox="true"/>
-            <p:nvPr/>
-          </p:nvSpPr>
-          <p:spPr>
-            <a:xfrm>
-              <a:off x="0" y="-19050"/>
-              <a:ext cx="11716963" cy="1116018"/>
-            </a:xfrm>
-            <a:prstGeom prst="rect">
-              <a:avLst/>
-            </a:prstGeom>
-          </p:spPr>
-          <p:txBody>
-            <a:bodyPr anchor="ctr" rtlCol="false" tIns="0" lIns="0" bIns="0" rIns="0"/>
-            <a:lstStyle/>
-            <a:p>
-              <a:pPr algn="ctr">
-                <a:lnSpc>
-                  <a:spcPts val="2092"/>
-                </a:lnSpc>
-              </a:pPr>
-              <a:r>
-                <a:rPr lang="en-US" sz="1743">
-                  <a:solidFill>
-                    <a:srgbClr val="000000"/>
-                  </a:solidFill>
-                  <a:latin typeface="Arial"/>
-                  <a:ea typeface="Arial"/>
-                  <a:cs typeface="Arial"/>
-                  <a:sym typeface="Arial"/>
-                </a:rPr>
-                <a:t>INTRODUÇÃO</a:t>
-              </a:r>
-            </a:p>
-          </p:txBody>
-        </p:sp>
-      </p:grpSp>
-      <p:sp>
-        <p:nvSpPr>
-          <p:cNvPr name="Freeform 11" id="11"/>
-          <p:cNvSpPr/>
-          <p:nvPr/>
-        </p:nvSpPr>
-        <p:spPr>
-          <a:xfrm flipH="false" flipV="false" rot="0">
-            <a:off x="731520" y="3657600"/>
-            <a:ext cx="3129133" cy="3129133"/>
-          </a:xfrm>
-          <a:custGeom>
-            <a:avLst/>
-            <a:gdLst/>
-            <a:ahLst/>
-            <a:cxnLst/>
-            <a:rect r="r" b="b" t="t" l="l"/>
-            <a:pathLst>
-              <a:path h="3129133" w="3129133">
-                <a:moveTo>
-                  <a:pt x="0" y="0"/>
-                </a:moveTo>
-                <a:lnTo>
-                  <a:pt x="3129133" y="0"/>
-                </a:lnTo>
-                <a:lnTo>
-                  <a:pt x="3129133" y="3129133"/>
-                </a:lnTo>
-                <a:lnTo>
-                  <a:pt x="0" y="3129133"/>
-                </a:lnTo>
-                <a:lnTo>
-                  <a:pt x="0" y="0"/>
-                </a:lnTo>
-                <a:close/>
-              </a:path>
-            </a:pathLst>
-          </a:custGeom>
-          <a:blipFill>
-            <a:blip r:embed="rId3"/>
-            <a:stretch>
-              <a:fillRect l="0" t="0" r="0" b="0"/>
-            </a:stretch>
-          </a:blipFill>
-        </p:spPr>
-      </p:sp>
-      <p:sp>
-        <p:nvSpPr>
-          <p:cNvPr name="Freeform 12" id="12"/>
-          <p:cNvSpPr/>
-          <p:nvPr/>
-        </p:nvSpPr>
-        <p:spPr>
-          <a:xfrm flipH="false" flipV="false" rot="0">
-            <a:off x="6141528" y="3657600"/>
-            <a:ext cx="3129133" cy="3129133"/>
-          </a:xfrm>
-          <a:custGeom>
-            <a:avLst/>
-            <a:gdLst/>
-            <a:ahLst/>
-            <a:cxnLst/>
-            <a:rect r="r" b="b" t="t" l="l"/>
-            <a:pathLst>
-              <a:path h="3129133" w="3129133">
-                <a:moveTo>
-                  <a:pt x="0" y="0"/>
-                </a:moveTo>
-                <a:lnTo>
-                  <a:pt x="3129133" y="0"/>
-                </a:lnTo>
-                <a:lnTo>
-                  <a:pt x="3129133" y="3129133"/>
-                </a:lnTo>
-                <a:lnTo>
-                  <a:pt x="0" y="3129133"/>
-                </a:lnTo>
-                <a:lnTo>
-                  <a:pt x="0" y="0"/>
-                </a:lnTo>
-                <a:close/>
-              </a:path>
-            </a:pathLst>
-          </a:custGeom>
-          <a:blipFill>
-            <a:blip r:embed="rId4"/>
-            <a:stretch>
-              <a:fillRect l="0" t="0" r="0" b="0"/>
-            </a:stretch>
-          </a:blipFill>
-        </p:spPr>
-      </p:sp>
-      <p:sp>
-        <p:nvSpPr>
-          <p:cNvPr name="TextBox 13" id="13"/>
-          <p:cNvSpPr txBox="true"/>
-          <p:nvPr/>
-        </p:nvSpPr>
-        <p:spPr>
-          <a:xfrm rot="0">
-            <a:off x="482939" y="1309685"/>
-            <a:ext cx="8787722" cy="2476500"/>
-          </a:xfrm>
-          <a:prstGeom prst="rect">
-            <a:avLst/>
-          </a:prstGeom>
-        </p:spPr>
-        <p:txBody>
-          <a:bodyPr anchor="t" rtlCol="false" tIns="0" lIns="0" bIns="0" rIns="0">
-            <a:spAutoFit/>
-          </a:bodyPr>
-          <a:lstStyle/>
-          <a:p>
-            <a:pPr algn="just">
-              <a:lnSpc>
-                <a:spcPts val="2790"/>
-              </a:lnSpc>
-            </a:pPr>
-            <a:r>
-              <a:rPr lang="en-US" sz="2325">
-                <a:solidFill>
-                  <a:srgbClr val="000000"/>
-                </a:solidFill>
-                <a:latin typeface="Arial"/>
-                <a:ea typeface="Arial"/>
-                <a:cs typeface="Arial"/>
-                <a:sym typeface="Arial"/>
-              </a:rPr>
-              <a:t>Isso começou a ser discutido por volta da década de 1980, quando o mercado de tecnologia cresceu de forma acelerada e deixou o hardware mais acessível. Assim, o software passou a ser vendido separadamente, pois até então era comum o software vir junto com o hardware comprado, inclusive com o código-fonte permitindo alterações (MOSSOF, 2014, p. 10). </a:t>
-            </a:r>
-          </a:p>
-          <a:p>
-            <a:pPr algn="just">
-              <a:lnSpc>
-                <a:spcPts val="2790"/>
-              </a:lnSpc>
-            </a:pPr>
-          </a:p>
-        </p:txBody>
-      </p:sp>
-    </p:spTree>
-  </p:cSld>
-  <p:clrMapOvr>
-    <a:masterClrMapping/>
-  </p:clrMapOvr>
-</p:sld>
-</file>
-
-<file path=ppt/slides/slide4.xml><?xml version="1.0" encoding="utf-8"?>
-<p:sld xmlns:p="http://schemas.openxmlformats.org/presentationml/2006/main" xmlns:a="http://schemas.openxmlformats.org/drawingml/2006/main" xmlns:r="http://schemas.openxmlformats.org/officeDocument/2006/relationships">
-  <p:cSld>
-    <p:spTree>
-      <p:nvGrpSpPr>
-        <p:cNvPr id="1" name=""/>
-        <p:cNvGrpSpPr/>
-        <p:nvPr/>
-      </p:nvGrpSpPr>
-      <p:grpSpPr>
-        <a:xfrm>
-          <a:off x="0" y="0"/>
-          <a:ext cx="0" cy="0"/>
-          <a:chOff x="0" y="0"/>
-          <a:chExt cx="0" cy="0"/>
-        </a:xfrm>
-      </p:grpSpPr>
-      <p:grpSp>
-        <p:nvGrpSpPr>
-          <p:cNvPr name="Group 2" id="2"/>
-          <p:cNvGrpSpPr/>
-          <p:nvPr/>
-        </p:nvGrpSpPr>
-        <p:grpSpPr>
-          <a:xfrm rot="0">
-            <a:off x="487567" y="292261"/>
-            <a:ext cx="8787722" cy="822726"/>
-            <a:chOff x="0" y="0"/>
-            <a:chExt cx="11716963" cy="1096968"/>
-          </a:xfrm>
-        </p:grpSpPr>
-        <p:sp>
-          <p:nvSpPr>
-            <p:cNvPr name="Freeform 3" id="3"/>
-            <p:cNvSpPr/>
-            <p:nvPr/>
-          </p:nvSpPr>
-          <p:spPr>
-            <a:xfrm flipH="false" flipV="false" rot="0">
-              <a:off x="0" y="0"/>
-              <a:ext cx="11716962" cy="1096969"/>
-            </a:xfrm>
-            <a:custGeom>
-              <a:avLst/>
-              <a:gdLst/>
-              <a:ahLst/>
-              <a:cxnLst/>
-              <a:rect r="r" b="b" t="t" l="l"/>
-              <a:pathLst>
-                <a:path h="1096969" w="11716962">
-                  <a:moveTo>
-                    <a:pt x="0" y="0"/>
-                  </a:moveTo>
-                  <a:lnTo>
-                    <a:pt x="11716962" y="0"/>
-                  </a:lnTo>
-                  <a:lnTo>
-                    <a:pt x="11716962" y="1096969"/>
-                  </a:lnTo>
-                  <a:lnTo>
-                    <a:pt x="0" y="1096969"/>
-                  </a:lnTo>
-                  <a:close/>
-                </a:path>
-              </a:pathLst>
-            </a:custGeom>
-            <a:solidFill>
-              <a:srgbClr val="000000">
-                <a:alpha val="0"/>
-              </a:srgbClr>
-            </a:solidFill>
-          </p:spPr>
-        </p:sp>
-        <p:sp>
-          <p:nvSpPr>
-            <p:cNvPr name="TextBox 4" id="4"/>
-            <p:cNvSpPr txBox="true"/>
-            <p:nvPr/>
-          </p:nvSpPr>
-          <p:spPr>
-            <a:xfrm>
-              <a:off x="0" y="-19050"/>
-              <a:ext cx="11716963" cy="1116018"/>
-            </a:xfrm>
-            <a:prstGeom prst="rect">
-              <a:avLst/>
-            </a:prstGeom>
-          </p:spPr>
-          <p:txBody>
-            <a:bodyPr anchor="ctr" rtlCol="false" tIns="0" lIns="0" bIns="0" rIns="0"/>
-            <a:lstStyle/>
-            <a:p>
-              <a:pPr algn="ctr">
-                <a:lnSpc>
-                  <a:spcPts val="2092"/>
-                </a:lnSpc>
-              </a:pPr>
-              <a:r>
-                <a:rPr lang="en-US" sz="1743">
-                  <a:solidFill>
-                    <a:srgbClr val="000000"/>
-                  </a:solidFill>
-                  <a:latin typeface="Arial"/>
-                  <a:ea typeface="Arial"/>
-                  <a:cs typeface="Arial"/>
-                  <a:sym typeface="Arial"/>
-                </a:rPr>
-                <a:t>INTRODUÇÃO</a:t>
-              </a:r>
-            </a:p>
-          </p:txBody>
-        </p:sp>
-      </p:grpSp>
-      <p:grpSp>
-        <p:nvGrpSpPr>
-          <p:cNvPr name="Group 5" id="5"/>
-          <p:cNvGrpSpPr/>
-          <p:nvPr/>
-        </p:nvGrpSpPr>
-        <p:grpSpPr>
-          <a:xfrm rot="0">
-            <a:off x="487567" y="292261"/>
-            <a:ext cx="8787722" cy="822726"/>
-            <a:chOff x="0" y="0"/>
-            <a:chExt cx="11716963" cy="1096968"/>
-          </a:xfrm>
-        </p:grpSpPr>
-        <p:sp>
-          <p:nvSpPr>
-            <p:cNvPr name="Freeform 6" id="6"/>
-            <p:cNvSpPr/>
-            <p:nvPr/>
-          </p:nvSpPr>
-          <p:spPr>
-            <a:xfrm flipH="false" flipV="false" rot="0">
-              <a:off x="0" y="0"/>
-              <a:ext cx="11716962" cy="1096969"/>
-            </a:xfrm>
-            <a:custGeom>
-              <a:avLst/>
-              <a:gdLst/>
-              <a:ahLst/>
-              <a:cxnLst/>
-              <a:rect r="r" b="b" t="t" l="l"/>
-              <a:pathLst>
-                <a:path h="1096969" w="11716962">
-                  <a:moveTo>
-                    <a:pt x="0" y="0"/>
-                  </a:moveTo>
-                  <a:lnTo>
-                    <a:pt x="11716962" y="0"/>
-                  </a:lnTo>
-                  <a:lnTo>
-                    <a:pt x="11716962" y="1096969"/>
-                  </a:lnTo>
-                  <a:lnTo>
-                    <a:pt x="0" y="1096969"/>
-                  </a:lnTo>
-                  <a:close/>
-                </a:path>
-              </a:pathLst>
-            </a:custGeom>
-            <a:solidFill>
-              <a:srgbClr val="000000">
-                <a:alpha val="0"/>
-              </a:srgbClr>
-            </a:solidFill>
-          </p:spPr>
-        </p:sp>
-        <p:sp>
-          <p:nvSpPr>
-            <p:cNvPr name="TextBox 7" id="7"/>
-            <p:cNvSpPr txBox="true"/>
-            <p:nvPr/>
-          </p:nvSpPr>
-          <p:spPr>
-            <a:xfrm>
-              <a:off x="0" y="-19050"/>
-              <a:ext cx="11716963" cy="1116018"/>
-            </a:xfrm>
-            <a:prstGeom prst="rect">
-              <a:avLst/>
-            </a:prstGeom>
-          </p:spPr>
-          <p:txBody>
-            <a:bodyPr anchor="ctr" rtlCol="false" tIns="0" lIns="0" bIns="0" rIns="0"/>
-            <a:lstStyle/>
-            <a:p>
-              <a:pPr algn="ctr">
-                <a:lnSpc>
-                  <a:spcPts val="2092"/>
-                </a:lnSpc>
-              </a:pPr>
-              <a:r>
-                <a:rPr lang="en-US" sz="1743">
-                  <a:solidFill>
-                    <a:srgbClr val="000000"/>
-                  </a:solidFill>
-                  <a:latin typeface="Arial"/>
-                  <a:ea typeface="Arial"/>
-                  <a:cs typeface="Arial"/>
-                  <a:sym typeface="Arial"/>
-                </a:rPr>
-                <a:t>INTRODUÇÃO</a:t>
-              </a:r>
-            </a:p>
-          </p:txBody>
-        </p:sp>
-      </p:grpSp>
-      <p:grpSp>
-        <p:nvGrpSpPr>
-          <p:cNvPr name="Group 8" id="8"/>
-          <p:cNvGrpSpPr/>
-          <p:nvPr/>
-        </p:nvGrpSpPr>
-        <p:grpSpPr>
-          <a:xfrm rot="0">
-            <a:off x="487567" y="292261"/>
-            <a:ext cx="8787722" cy="822726"/>
-            <a:chOff x="0" y="0"/>
-            <a:chExt cx="11716963" cy="1096968"/>
-          </a:xfrm>
-        </p:grpSpPr>
-        <p:sp>
-          <p:nvSpPr>
-            <p:cNvPr name="Freeform 9" id="9"/>
-            <p:cNvSpPr/>
-            <p:nvPr/>
-          </p:nvSpPr>
-          <p:spPr>
-            <a:xfrm flipH="false" flipV="false" rot="0">
-              <a:off x="0" y="0"/>
-              <a:ext cx="11716962" cy="1096969"/>
-            </a:xfrm>
-            <a:custGeom>
-              <a:avLst/>
-              <a:gdLst/>
-              <a:ahLst/>
-              <a:cxnLst/>
-              <a:rect r="r" b="b" t="t" l="l"/>
-              <a:pathLst>
-                <a:path h="1096969" w="11716962">
-                  <a:moveTo>
-                    <a:pt x="0" y="0"/>
-                  </a:moveTo>
-                  <a:lnTo>
-                    <a:pt x="11716962" y="0"/>
-                  </a:lnTo>
-                  <a:lnTo>
-                    <a:pt x="11716962" y="1096969"/>
-                  </a:lnTo>
-                  <a:lnTo>
-                    <a:pt x="0" y="1096969"/>
-                  </a:lnTo>
-                  <a:close/>
-                </a:path>
-              </a:pathLst>
-            </a:custGeom>
-            <a:solidFill>
-              <a:srgbClr val="000000">
-                <a:alpha val="0"/>
-              </a:srgbClr>
-            </a:solidFill>
-          </p:spPr>
-        </p:sp>
-        <p:sp>
-          <p:nvSpPr>
-            <p:cNvPr name="TextBox 10" id="10"/>
-            <p:cNvSpPr txBox="true"/>
-            <p:nvPr/>
-          </p:nvSpPr>
-          <p:spPr>
-            <a:xfrm>
-              <a:off x="0" y="-19050"/>
-              <a:ext cx="11716963" cy="1116018"/>
-            </a:xfrm>
-            <a:prstGeom prst="rect">
-              <a:avLst/>
-            </a:prstGeom>
-          </p:spPr>
-          <p:txBody>
-            <a:bodyPr anchor="ctr" rtlCol="false" tIns="0" lIns="0" bIns="0" rIns="0"/>
-            <a:lstStyle/>
-            <a:p>
-              <a:pPr algn="ctr">
-                <a:lnSpc>
-                  <a:spcPts val="2092"/>
-                </a:lnSpc>
-              </a:pPr>
-              <a:r>
-                <a:rPr lang="en-US" sz="1743">
-                  <a:solidFill>
-                    <a:srgbClr val="000000"/>
-                  </a:solidFill>
-                  <a:latin typeface="Arial"/>
-                  <a:ea typeface="Arial"/>
-                  <a:cs typeface="Arial"/>
-                  <a:sym typeface="Arial"/>
-                </a:rPr>
-                <a:t>INTRODUÇÃO</a:t>
-              </a:r>
-            </a:p>
-          </p:txBody>
-        </p:sp>
-      </p:grpSp>
-      <p:sp>
-        <p:nvSpPr>
-          <p:cNvPr name="Freeform 11" id="11"/>
-          <p:cNvSpPr/>
-          <p:nvPr/>
-        </p:nvSpPr>
-        <p:spPr>
-          <a:xfrm flipH="false" flipV="false" rot="0">
-            <a:off x="2757409" y="4948291"/>
-            <a:ext cx="6517880" cy="2019611"/>
-          </a:xfrm>
-          <a:custGeom>
-            <a:avLst/>
-            <a:gdLst/>
-            <a:ahLst/>
-            <a:cxnLst/>
-            <a:rect r="r" b="b" t="t" l="l"/>
-            <a:pathLst>
-              <a:path h="2019611" w="6517880">
-                <a:moveTo>
-                  <a:pt x="0" y="0"/>
-                </a:moveTo>
-                <a:lnTo>
-                  <a:pt x="6517880" y="0"/>
-                </a:lnTo>
-                <a:lnTo>
-                  <a:pt x="6517880" y="2019611"/>
-                </a:lnTo>
-                <a:lnTo>
-                  <a:pt x="0" y="2019611"/>
-                </a:lnTo>
-                <a:lnTo>
-                  <a:pt x="0" y="0"/>
-                </a:lnTo>
-                <a:close/>
-              </a:path>
-            </a:pathLst>
-          </a:custGeom>
-          <a:blipFill>
-            <a:blip r:embed="rId3"/>
-            <a:stretch>
-              <a:fillRect l="0" t="-36201" r="0" b="-36201"/>
-            </a:stretch>
-          </a:blipFill>
-        </p:spPr>
-      </p:sp>
-      <p:sp>
-        <p:nvSpPr>
-          <p:cNvPr name="TextBox 12" id="12"/>
-          <p:cNvSpPr txBox="true"/>
-          <p:nvPr/>
-        </p:nvSpPr>
-        <p:spPr>
-          <a:xfrm rot="0">
-            <a:off x="487567" y="1105463"/>
-            <a:ext cx="8787722" cy="2828925"/>
-          </a:xfrm>
-          <a:prstGeom prst="rect">
-            <a:avLst/>
-          </a:prstGeom>
-        </p:spPr>
-        <p:txBody>
-          <a:bodyPr anchor="t" rtlCol="false" tIns="0" lIns="0" bIns="0" rIns="0">
-            <a:spAutoFit/>
-          </a:bodyPr>
-          <a:lstStyle/>
-          <a:p>
-            <a:pPr algn="just">
-              <a:lnSpc>
-                <a:spcPts val="2790"/>
-              </a:lnSpc>
-            </a:pPr>
-            <a:r>
-              <a:rPr lang="en-US" sz="2325">
-                <a:solidFill>
-                  <a:srgbClr val="000000"/>
-                </a:solidFill>
-                <a:latin typeface="Arial"/>
-                <a:ea typeface="Arial"/>
-                <a:cs typeface="Arial"/>
-                <a:sym typeface="Arial"/>
-              </a:rPr>
-              <a:t>Atualmente existem as licenças proprietárias, como os contratos de EULA, que limitam o uso e resguardam os interesses das empresas, e licenças livres, como a GNU GPL, que priorizam a colaboração e o compartilhamento. Esse contraste revela uma questão atual e relevante: como equilibrar o direito à propriedade intelectual com a necessidade de democratizar o acesso à tecnologia, tema discutido por autores como Stallman (2002) e Lessig (2004).</a:t>
-            </a:r>
-          </a:p>
-        </p:txBody>
-      </p:sp>
-    </p:spTree>
-  </p:cSld>
-  <p:clrMapOvr>
-    <a:masterClrMapping/>
-  </p:clrMapOvr>
-</p:sld>
-</file>
-
-<file path=ppt/slides/slide5.xml><?xml version="1.0" encoding="utf-8"?>
-<p:sld xmlns:p="http://schemas.openxmlformats.org/presentationml/2006/main" xmlns:a="http://schemas.openxmlformats.org/drawingml/2006/main">
-  <p:cSld>
-    <p:spTree>
-      <p:nvGrpSpPr>
-        <p:cNvPr id="1" name=""/>
-        <p:cNvGrpSpPr/>
-        <p:nvPr/>
-      </p:nvGrpSpPr>
-      <p:grpSpPr>
-        <a:xfrm>
-          <a:off x="0" y="0"/>
-          <a:ext cx="0" cy="0"/>
-          <a:chOff x="0" y="0"/>
-          <a:chExt cx="0" cy="0"/>
-        </a:xfrm>
-      </p:grpSpPr>
-      <p:grpSp>
-        <p:nvGrpSpPr>
-          <p:cNvPr name="Group 2" id="2"/>
-          <p:cNvGrpSpPr/>
-          <p:nvPr/>
-        </p:nvGrpSpPr>
-        <p:grpSpPr>
-          <a:xfrm rot="0">
-            <a:off x="487567" y="320157"/>
-            <a:ext cx="8787722" cy="822726"/>
-            <a:chOff x="0" y="0"/>
-            <a:chExt cx="11716963" cy="1096968"/>
-          </a:xfrm>
-        </p:grpSpPr>
-        <p:sp>
-          <p:nvSpPr>
-            <p:cNvPr name="Freeform 3" id="3"/>
-            <p:cNvSpPr/>
-            <p:nvPr/>
-          </p:nvSpPr>
-          <p:spPr>
-            <a:xfrm flipH="false" flipV="false" rot="0">
-              <a:off x="0" y="0"/>
-              <a:ext cx="11716962" cy="1096969"/>
-            </a:xfrm>
-            <a:custGeom>
-              <a:avLst/>
-              <a:gdLst/>
-              <a:ahLst/>
-              <a:cxnLst/>
-              <a:rect r="r" b="b" t="t" l="l"/>
-              <a:pathLst>
-                <a:path h="1096969" w="11716962">
-                  <a:moveTo>
-                    <a:pt x="0" y="0"/>
-                  </a:moveTo>
-                  <a:lnTo>
-                    <a:pt x="11716962" y="0"/>
-                  </a:lnTo>
-                  <a:lnTo>
-                    <a:pt x="11716962" y="1096969"/>
-                  </a:lnTo>
-                  <a:lnTo>
-                    <a:pt x="0" y="1096969"/>
-                  </a:lnTo>
-                  <a:close/>
-                </a:path>
-              </a:pathLst>
-            </a:custGeom>
-            <a:solidFill>
-              <a:srgbClr val="000000">
-                <a:alpha val="0"/>
-              </a:srgbClr>
-            </a:solidFill>
-          </p:spPr>
-        </p:sp>
-        <p:sp>
-          <p:nvSpPr>
-            <p:cNvPr name="TextBox 4" id="4"/>
-            <p:cNvSpPr txBox="true"/>
-            <p:nvPr/>
-          </p:nvSpPr>
-          <p:spPr>
-            <a:xfrm>
-              <a:off x="0" y="-9525"/>
-              <a:ext cx="11716963" cy="1106493"/>
-            </a:xfrm>
-            <a:prstGeom prst="rect">
-              <a:avLst/>
-            </a:prstGeom>
-          </p:spPr>
-          <p:txBody>
-            <a:bodyPr anchor="ctr" rtlCol="false" tIns="0" lIns="0" bIns="0" rIns="0"/>
-            <a:lstStyle/>
-            <a:p>
-              <a:pPr algn="ctr">
-                <a:lnSpc>
-                  <a:spcPts val="2932"/>
-                </a:lnSpc>
-              </a:pPr>
-              <a:r>
-                <a:rPr lang="en-US" sz="2443" b="true">
-                  <a:solidFill>
-                    <a:srgbClr val="000000"/>
-                  </a:solidFill>
-                  <a:latin typeface="Arial Bold"/>
-                  <a:ea typeface="Arial Bold"/>
-                  <a:cs typeface="Arial Bold"/>
-                  <a:sym typeface="Arial Bold"/>
-                </a:rPr>
-                <a:t>Objetivo</a:t>
-              </a:r>
-            </a:p>
-          </p:txBody>
-        </p:sp>
-      </p:grpSp>
-      <p:sp>
-        <p:nvSpPr>
-          <p:cNvPr name="TextBox 5" id="5"/>
-          <p:cNvSpPr txBox="true"/>
-          <p:nvPr/>
-        </p:nvSpPr>
-        <p:spPr>
-          <a:xfrm rot="0">
-            <a:off x="487567" y="1807396"/>
-            <a:ext cx="8787722" cy="2124075"/>
-          </a:xfrm>
-          <a:prstGeom prst="rect">
-            <a:avLst/>
-          </a:prstGeom>
-        </p:spPr>
-        <p:txBody>
-          <a:bodyPr anchor="t" rtlCol="false" tIns="0" lIns="0" bIns="0" rIns="0">
-            <a:spAutoFit/>
-          </a:bodyPr>
-          <a:lstStyle/>
-          <a:p>
-            <a:pPr algn="just">
-              <a:lnSpc>
-                <a:spcPts val="2790"/>
-              </a:lnSpc>
-            </a:pPr>
-            <a:r>
-              <a:rPr lang="en-US" sz="2325">
-                <a:solidFill>
-                  <a:srgbClr val="000000"/>
-                </a:solidFill>
-                <a:latin typeface="Arial"/>
-                <a:ea typeface="Arial"/>
-                <a:cs typeface="Arial"/>
-                <a:sym typeface="Arial"/>
-              </a:rPr>
-              <a:t>Compreender os diferentes tipos de licenciamento de software existentes e analisar suas implicações legais, técnicas e sociais.</a:t>
-            </a:r>
-          </a:p>
-          <a:p>
-            <a:pPr algn="just">
-              <a:lnSpc>
-                <a:spcPts val="2790"/>
-              </a:lnSpc>
-            </a:pPr>
-            <a:r>
-              <a:rPr lang="en-US" sz="2325">
-                <a:solidFill>
-                  <a:srgbClr val="000000"/>
-                </a:solidFill>
-                <a:latin typeface="Arial"/>
-                <a:ea typeface="Arial"/>
-                <a:cs typeface="Arial"/>
-                <a:sym typeface="Arial"/>
-              </a:rPr>
-              <a:t>Esta pesquisa justifica-se pela importância do software atualmente, tornando indispensável a compreensão das regras de uso e distribuição, do ponto de vista teórico, jurídico e filosófico</a:t>
-            </a:r>
-          </a:p>
-          <a:p>
-            <a:pPr algn="just">
-              <a:lnSpc>
-                <a:spcPts val="2790"/>
-              </a:lnSpc>
-            </a:pPr>
-          </a:p>
-        </p:txBody>
-      </p:sp>
-    </p:spTree>
-  </p:cSld>
-  <p:clrMapOvr>
-    <a:masterClrMapping/>
-  </p:clrMapOvr>
-</p:sld>
-</file>
-
-<file path=ppt/slides/slide6.xml><?xml version="1.0" encoding="utf-8"?>
-<p:sld xmlns:p="http://schemas.openxmlformats.org/presentationml/2006/main" xmlns:a="http://schemas.openxmlformats.org/drawingml/2006/main">
-  <p:cSld>
-    <p:spTree>
-      <p:nvGrpSpPr>
-        <p:cNvPr id="1" name=""/>
-        <p:cNvGrpSpPr/>
-        <p:nvPr/>
-      </p:nvGrpSpPr>
-      <p:grpSpPr>
-        <a:xfrm>
-          <a:off x="0" y="0"/>
-          <a:ext cx="0" cy="0"/>
-          <a:chOff x="0" y="0"/>
-          <a:chExt cx="0" cy="0"/>
-        </a:xfrm>
-      </p:grpSpPr>
-      <p:sp>
-        <p:nvSpPr>
-          <p:cNvPr name="TextBox 2" id="2"/>
-          <p:cNvSpPr txBox="true"/>
-          <p:nvPr/>
-        </p:nvSpPr>
-        <p:spPr>
-          <a:xfrm rot="0">
-            <a:off x="2739267" y="460395"/>
-            <a:ext cx="6001268" cy="561300"/>
-          </a:xfrm>
-          <a:prstGeom prst="rect">
-            <a:avLst/>
-          </a:prstGeom>
-        </p:spPr>
-        <p:txBody>
-          <a:bodyPr anchor="t" rtlCol="false" tIns="0" lIns="0" bIns="0" rIns="0">
-            <a:spAutoFit/>
-          </a:bodyPr>
-          <a:lstStyle/>
-          <a:p>
-            <a:pPr algn="l">
-              <a:lnSpc>
-                <a:spcPts val="4163"/>
-              </a:lnSpc>
-            </a:pPr>
-            <a:r>
-              <a:rPr lang="en-US" sz="3854">
-                <a:solidFill>
-                  <a:srgbClr val="000000"/>
-                </a:solidFill>
-                <a:latin typeface="Arial"/>
-                <a:ea typeface="Arial"/>
-                <a:cs typeface="Arial"/>
-                <a:sym typeface="Arial"/>
-              </a:rPr>
-              <a:t>Softwere Propietário</a:t>
-            </a:r>
-          </a:p>
-        </p:txBody>
-      </p:sp>
-      <p:sp>
-        <p:nvSpPr>
-          <p:cNvPr name="TextBox 3" id="3"/>
-          <p:cNvSpPr txBox="true"/>
-          <p:nvPr/>
-        </p:nvSpPr>
-        <p:spPr>
-          <a:xfrm rot="0">
-            <a:off x="417452" y="1694815"/>
-            <a:ext cx="9077725" cy="4668520"/>
-          </a:xfrm>
-          <a:prstGeom prst="rect">
-            <a:avLst/>
-          </a:prstGeom>
-        </p:spPr>
-        <p:txBody>
-          <a:bodyPr anchor="t" rtlCol="false" tIns="0" lIns="0" bIns="0" rIns="0">
-            <a:spAutoFit/>
-          </a:bodyPr>
-          <a:lstStyle/>
-          <a:p>
-            <a:pPr algn="ctr">
-              <a:lnSpc>
-                <a:spcPts val="3079"/>
-              </a:lnSpc>
-            </a:pPr>
-            <a:r>
-              <a:rPr lang="en-US" sz="2199">
-                <a:solidFill>
-                  <a:srgbClr val="000000"/>
-                </a:solidFill>
-                <a:latin typeface="Open Sans"/>
-                <a:ea typeface="Open Sans"/>
-                <a:cs typeface="Open Sans"/>
-                <a:sym typeface="Open Sans"/>
-              </a:rPr>
-              <a:t>O software proprietário caracteriza-se pela restrição do acesso ao código-fonte, limitando a modificação e a redistribuição. Segundo a UNESCO (2017), “o software proprietário é aquele cuja licença impede ou restringe a cópia, modificação e distribuição, sendo o fornecedor o detentor dos direitos exclusivos” (UNESCO, 2017, p. 12).</a:t>
-            </a:r>
-          </a:p>
-          <a:p>
-            <a:pPr algn="ctr">
-              <a:lnSpc>
-                <a:spcPts val="3079"/>
-              </a:lnSpc>
-            </a:pPr>
-          </a:p>
-          <a:p>
-            <a:pPr algn="ctr">
-              <a:lnSpc>
-                <a:spcPts val="3079"/>
-              </a:lnSpc>
-            </a:pPr>
-          </a:p>
-          <a:p>
-            <a:pPr algn="ctr">
-              <a:lnSpc>
-                <a:spcPts val="3079"/>
-              </a:lnSpc>
-            </a:pPr>
-            <a:r>
-              <a:rPr lang="en-US" sz="2199">
-                <a:solidFill>
-                  <a:srgbClr val="000000"/>
-                </a:solidFill>
-                <a:latin typeface="Open Sans"/>
-                <a:ea typeface="Open Sans"/>
-                <a:cs typeface="Open Sans"/>
-                <a:sym typeface="Open Sans"/>
-              </a:rPr>
-              <a:t>Entre as vantagens, destacam-se a segurança, a confiabilidade e o suporte técnico fornecido pelo desenvolvedor. Por outro lado, apresentam-se como desvantagens os altos custos, a dependência de fornecedores e a falta de autonomia do usuário (SOARES, 2020).</a:t>
-            </a:r>
-          </a:p>
-          <a:p>
-            <a:pPr algn="ctr">
-              <a:lnSpc>
-                <a:spcPts val="3079"/>
-              </a:lnSpc>
-            </a:pPr>
-          </a:p>
-        </p:txBody>
-      </p:sp>
-    </p:spTree>
-  </p:cSld>
-  <p:clrMapOvr>
-    <a:masterClrMapping/>
-  </p:clrMapOvr>
-</p:sld>
-</file>
-
-<file path=ppt/slides/slide7.xml><?xml version="1.0" encoding="utf-8"?>
-<p:sld xmlns:p="http://schemas.openxmlformats.org/presentationml/2006/main" xmlns:a="http://schemas.openxmlformats.org/drawingml/2006/main">
-  <p:cSld>
     <p:spTree>
       <p:nvGrpSpPr>
         <p:cNvPr id="1" name=""/>
@@ -7804,9 +6863,28 @@
 </p:sld>
 </file>
 
-<file path=ppt/slides/slide8.xml><?xml version="1.0" encoding="utf-8"?>
+<file path=ppt/slides/slide11.xml><?xml version="1.0" encoding="utf-8"?>
 <p:sld xmlns:p="http://schemas.openxmlformats.org/presentationml/2006/main" xmlns:a="http://schemas.openxmlformats.org/drawingml/2006/main">
   <p:cSld>
+    <p:bg>
+      <p:bgPr>
+        <a:gradFill rotWithShape="true">
+          <a:gsLst>
+            <a:gs pos="0">
+              <a:srgbClr val="E9F0F3">
+                <a:alpha val="100000"/>
+              </a:srgbClr>
+            </a:gs>
+            <a:gs pos="100000">
+              <a:srgbClr val="A2A5AC">
+                <a:alpha val="100000"/>
+              </a:srgbClr>
+            </a:gs>
+          </a:gsLst>
+          <a:lin ang="5400000"/>
+        </a:gradFill>
+      </p:bgPr>
+    </p:bg>
     <p:spTree>
       <p:nvGrpSpPr>
         <p:cNvPr id="1" name=""/>
@@ -8004,9 +7082,28 @@
 </p:sld>
 </file>
 
-<file path=ppt/slides/slide9.xml><?xml version="1.0" encoding="utf-8"?>
+<file path=ppt/slides/slide12.xml><?xml version="1.0" encoding="utf-8"?>
 <p:sld xmlns:p="http://schemas.openxmlformats.org/presentationml/2006/main" xmlns:a="http://schemas.openxmlformats.org/drawingml/2006/main" xmlns:r="http://schemas.openxmlformats.org/officeDocument/2006/relationships">
   <p:cSld>
+    <p:bg>
+      <p:bgPr>
+        <a:gradFill rotWithShape="true">
+          <a:gsLst>
+            <a:gs pos="0">
+              <a:srgbClr val="E9F0F3">
+                <a:alpha val="100000"/>
+              </a:srgbClr>
+            </a:gs>
+            <a:gs pos="100000">
+              <a:srgbClr val="A2A5AC">
+                <a:alpha val="100000"/>
+              </a:srgbClr>
+            </a:gs>
+          </a:gsLst>
+          <a:lin ang="5400000"/>
+        </a:gradFill>
+      </p:bgPr>
+    </p:bg>
     <p:spTree>
       <p:nvGrpSpPr>
         <p:cNvPr id="1" name=""/>
@@ -8645,6 +7742,1545 @@
           </p:spPr>
         </p:sp>
       </p:grpSp>
+    </p:spTree>
+  </p:cSld>
+  <p:clrMapOvr>
+    <a:masterClrMapping/>
+  </p:clrMapOvr>
+</p:sld>
+</file>
+
+<file path=ppt/slides/slide2.xml><?xml version="1.0" encoding="utf-8"?>
+<p:sld xmlns:p="http://schemas.openxmlformats.org/presentationml/2006/main" xmlns:a="http://schemas.openxmlformats.org/drawingml/2006/main" xmlns:r="http://schemas.openxmlformats.org/officeDocument/2006/relationships">
+  <p:cSld>
+    <p:bg>
+      <p:bgPr>
+        <a:gradFill rotWithShape="true">
+          <a:gsLst>
+            <a:gs pos="0">
+              <a:srgbClr val="E9F0F3">
+                <a:alpha val="100000"/>
+              </a:srgbClr>
+            </a:gs>
+            <a:gs pos="100000">
+              <a:srgbClr val="A2A5AC">
+                <a:alpha val="100000"/>
+              </a:srgbClr>
+            </a:gs>
+          </a:gsLst>
+          <a:lin ang="5400000"/>
+        </a:gradFill>
+      </p:bgPr>
+    </p:bg>
+    <p:spTree>
+      <p:nvGrpSpPr>
+        <p:cNvPr id="1" name=""/>
+        <p:cNvGrpSpPr/>
+        <p:nvPr/>
+      </p:nvGrpSpPr>
+      <p:grpSpPr>
+        <a:xfrm>
+          <a:off x="0" y="0"/>
+          <a:ext cx="0" cy="0"/>
+          <a:chOff x="0" y="0"/>
+          <a:chExt cx="0" cy="0"/>
+        </a:xfrm>
+      </p:grpSpPr>
+      <p:grpSp>
+        <p:nvGrpSpPr>
+          <p:cNvPr name="Group 2" id="2"/>
+          <p:cNvGrpSpPr/>
+          <p:nvPr/>
+        </p:nvGrpSpPr>
+        <p:grpSpPr>
+          <a:xfrm rot="0">
+            <a:off x="482939" y="150829"/>
+            <a:ext cx="8787722" cy="822726"/>
+            <a:chOff x="0" y="0"/>
+            <a:chExt cx="11716963" cy="1096968"/>
+          </a:xfrm>
+        </p:grpSpPr>
+        <p:sp>
+          <p:nvSpPr>
+            <p:cNvPr name="Freeform 3" id="3"/>
+            <p:cNvSpPr/>
+            <p:nvPr/>
+          </p:nvSpPr>
+          <p:spPr>
+            <a:xfrm flipH="false" flipV="false" rot="0">
+              <a:off x="0" y="0"/>
+              <a:ext cx="11716962" cy="1096969"/>
+            </a:xfrm>
+            <a:custGeom>
+              <a:avLst/>
+              <a:gdLst/>
+              <a:ahLst/>
+              <a:cxnLst/>
+              <a:rect r="r" b="b" t="t" l="l"/>
+              <a:pathLst>
+                <a:path h="1096969" w="11716962">
+                  <a:moveTo>
+                    <a:pt x="0" y="0"/>
+                  </a:moveTo>
+                  <a:lnTo>
+                    <a:pt x="11716962" y="0"/>
+                  </a:lnTo>
+                  <a:lnTo>
+                    <a:pt x="11716962" y="1096969"/>
+                  </a:lnTo>
+                  <a:lnTo>
+                    <a:pt x="0" y="1096969"/>
+                  </a:lnTo>
+                  <a:close/>
+                </a:path>
+              </a:pathLst>
+            </a:custGeom>
+            <a:solidFill>
+              <a:srgbClr val="000000">
+                <a:alpha val="0"/>
+              </a:srgbClr>
+            </a:solidFill>
+          </p:spPr>
+        </p:sp>
+        <p:sp>
+          <p:nvSpPr>
+            <p:cNvPr name="TextBox 4" id="4"/>
+            <p:cNvSpPr txBox="true"/>
+            <p:nvPr/>
+          </p:nvSpPr>
+          <p:spPr>
+            <a:xfrm>
+              <a:off x="0" y="-9525"/>
+              <a:ext cx="11716963" cy="1106493"/>
+            </a:xfrm>
+            <a:prstGeom prst="rect">
+              <a:avLst/>
+            </a:prstGeom>
+          </p:spPr>
+          <p:txBody>
+            <a:bodyPr anchor="ctr" rtlCol="false" tIns="0" lIns="0" bIns="0" rIns="0"/>
+            <a:lstStyle/>
+            <a:p>
+              <a:pPr algn="ctr">
+                <a:lnSpc>
+                  <a:spcPts val="2932"/>
+                </a:lnSpc>
+              </a:pPr>
+              <a:r>
+                <a:rPr lang="en-US" sz="2443">
+                  <a:solidFill>
+                    <a:srgbClr val="000000"/>
+                  </a:solidFill>
+                  <a:latin typeface="Arial"/>
+                  <a:ea typeface="Arial"/>
+                  <a:cs typeface="Arial"/>
+                  <a:sym typeface="Arial"/>
+                </a:rPr>
+                <a:t>INTRODUÇÃO</a:t>
+              </a:r>
+            </a:p>
+          </p:txBody>
+        </p:sp>
+      </p:grpSp>
+      <p:sp>
+        <p:nvSpPr>
+          <p:cNvPr name="Freeform 5" id="5"/>
+          <p:cNvSpPr/>
+          <p:nvPr/>
+        </p:nvSpPr>
+        <p:spPr>
+          <a:xfrm flipH="false" flipV="false" rot="0">
+            <a:off x="3134020" y="3456641"/>
+            <a:ext cx="8437264" cy="3858559"/>
+          </a:xfrm>
+          <a:custGeom>
+            <a:avLst/>
+            <a:gdLst/>
+            <a:ahLst/>
+            <a:cxnLst/>
+            <a:rect r="r" b="b" t="t" l="l"/>
+            <a:pathLst>
+              <a:path h="3858559" w="8437264">
+                <a:moveTo>
+                  <a:pt x="0" y="0"/>
+                </a:moveTo>
+                <a:lnTo>
+                  <a:pt x="8437264" y="0"/>
+                </a:lnTo>
+                <a:lnTo>
+                  <a:pt x="8437264" y="3858559"/>
+                </a:lnTo>
+                <a:lnTo>
+                  <a:pt x="0" y="3858559"/>
+                </a:lnTo>
+                <a:lnTo>
+                  <a:pt x="0" y="0"/>
+                </a:lnTo>
+                <a:close/>
+              </a:path>
+            </a:pathLst>
+          </a:custGeom>
+          <a:blipFill>
+            <a:blip r:embed="rId3"/>
+            <a:stretch>
+              <a:fillRect l="0" t="-155" r="0" b="-155"/>
+            </a:stretch>
+          </a:blipFill>
+        </p:spPr>
+      </p:sp>
+      <p:sp>
+        <p:nvSpPr>
+          <p:cNvPr name="TextBox 6" id="6"/>
+          <p:cNvSpPr txBox="true"/>
+          <p:nvPr/>
+        </p:nvSpPr>
+        <p:spPr>
+          <a:xfrm rot="0">
+            <a:off x="482939" y="1187581"/>
+            <a:ext cx="8448357" cy="2457450"/>
+          </a:xfrm>
+          <a:prstGeom prst="rect">
+            <a:avLst/>
+          </a:prstGeom>
+        </p:spPr>
+        <p:txBody>
+          <a:bodyPr anchor="t" rtlCol="false" tIns="0" lIns="0" bIns="0" rIns="0">
+            <a:spAutoFit/>
+          </a:bodyPr>
+          <a:lstStyle/>
+          <a:p>
+            <a:pPr algn="just">
+              <a:lnSpc>
+                <a:spcPts val="2790"/>
+              </a:lnSpc>
+            </a:pPr>
+            <a:r>
+              <a:rPr lang="en-US" sz="2325">
+                <a:solidFill>
+                  <a:srgbClr val="000000"/>
+                </a:solidFill>
+                <a:latin typeface="Century Gothic Paneuropean"/>
+                <a:ea typeface="Century Gothic Paneuropean"/>
+                <a:cs typeface="Century Gothic Paneuropean"/>
+                <a:sym typeface="Century Gothic Paneuropean"/>
+              </a:rPr>
+              <a:t>O licenciamento de software é uma parte muito presente no ordinário de quase todos, mesmo quando não se percebe. Sempre que é instalado um programa ou é aceitado um contrato de “termos de uso”, o usuário está diante de diferentes formas de regular o acesso, a distribuição e a modificação desse software.</a:t>
+            </a:r>
+          </a:p>
+          <a:p>
+            <a:pPr algn="just">
+              <a:lnSpc>
+                <a:spcPts val="2790"/>
+              </a:lnSpc>
+            </a:pPr>
+          </a:p>
+        </p:txBody>
+      </p:sp>
+    </p:spTree>
+  </p:cSld>
+  <p:clrMapOvr>
+    <a:masterClrMapping/>
+  </p:clrMapOvr>
+</p:sld>
+</file>
+
+<file path=ppt/slides/slide3.xml><?xml version="1.0" encoding="utf-8"?>
+<p:sld xmlns:p="http://schemas.openxmlformats.org/presentationml/2006/main" xmlns:a="http://schemas.openxmlformats.org/drawingml/2006/main" xmlns:r="http://schemas.openxmlformats.org/officeDocument/2006/relationships">
+  <p:cSld>
+    <p:bg>
+      <p:bgPr>
+        <a:gradFill rotWithShape="true">
+          <a:gsLst>
+            <a:gs pos="0">
+              <a:srgbClr val="E9F0F3">
+                <a:alpha val="100000"/>
+              </a:srgbClr>
+            </a:gs>
+            <a:gs pos="100000">
+              <a:srgbClr val="A2A5AC">
+                <a:alpha val="100000"/>
+              </a:srgbClr>
+            </a:gs>
+          </a:gsLst>
+          <a:lin ang="5400000"/>
+        </a:gradFill>
+      </p:bgPr>
+    </p:bg>
+    <p:spTree>
+      <p:nvGrpSpPr>
+        <p:cNvPr id="1" name=""/>
+        <p:cNvGrpSpPr/>
+        <p:nvPr/>
+      </p:nvGrpSpPr>
+      <p:grpSpPr>
+        <a:xfrm>
+          <a:off x="0" y="0"/>
+          <a:ext cx="0" cy="0"/>
+          <a:chOff x="0" y="0"/>
+          <a:chExt cx="0" cy="0"/>
+        </a:xfrm>
+      </p:grpSpPr>
+      <p:grpSp>
+        <p:nvGrpSpPr>
+          <p:cNvPr name="Group 2" id="2"/>
+          <p:cNvGrpSpPr/>
+          <p:nvPr/>
+        </p:nvGrpSpPr>
+        <p:grpSpPr>
+          <a:xfrm rot="0">
+            <a:off x="-1361150" y="455269"/>
+            <a:ext cx="8787722" cy="822726"/>
+            <a:chOff x="0" y="0"/>
+            <a:chExt cx="11716963" cy="1096968"/>
+          </a:xfrm>
+        </p:grpSpPr>
+        <p:sp>
+          <p:nvSpPr>
+            <p:cNvPr name="Freeform 3" id="3"/>
+            <p:cNvSpPr/>
+            <p:nvPr/>
+          </p:nvSpPr>
+          <p:spPr>
+            <a:xfrm flipH="false" flipV="false" rot="0">
+              <a:off x="0" y="0"/>
+              <a:ext cx="11716962" cy="1096969"/>
+            </a:xfrm>
+            <a:custGeom>
+              <a:avLst/>
+              <a:gdLst/>
+              <a:ahLst/>
+              <a:cxnLst/>
+              <a:rect r="r" b="b" t="t" l="l"/>
+              <a:pathLst>
+                <a:path h="1096969" w="11716962">
+                  <a:moveTo>
+                    <a:pt x="0" y="0"/>
+                  </a:moveTo>
+                  <a:lnTo>
+                    <a:pt x="11716962" y="0"/>
+                  </a:lnTo>
+                  <a:lnTo>
+                    <a:pt x="11716962" y="1096969"/>
+                  </a:lnTo>
+                  <a:lnTo>
+                    <a:pt x="0" y="1096969"/>
+                  </a:lnTo>
+                  <a:close/>
+                </a:path>
+              </a:pathLst>
+            </a:custGeom>
+            <a:solidFill>
+              <a:srgbClr val="000000">
+                <a:alpha val="0"/>
+              </a:srgbClr>
+            </a:solidFill>
+          </p:spPr>
+        </p:sp>
+        <p:sp>
+          <p:nvSpPr>
+            <p:cNvPr name="TextBox 4" id="4"/>
+            <p:cNvSpPr txBox="true"/>
+            <p:nvPr/>
+          </p:nvSpPr>
+          <p:spPr>
+            <a:xfrm>
+              <a:off x="0" y="-9525"/>
+              <a:ext cx="11716963" cy="1106493"/>
+            </a:xfrm>
+            <a:prstGeom prst="rect">
+              <a:avLst/>
+            </a:prstGeom>
+          </p:spPr>
+          <p:txBody>
+            <a:bodyPr anchor="ctr" rtlCol="false" tIns="0" lIns="0" bIns="0" rIns="0"/>
+            <a:lstStyle/>
+            <a:p>
+              <a:pPr algn="ctr">
+                <a:lnSpc>
+                  <a:spcPts val="2400"/>
+                </a:lnSpc>
+              </a:pPr>
+            </a:p>
+          </p:txBody>
+        </p:sp>
+      </p:grpSp>
+      <p:sp>
+        <p:nvSpPr>
+          <p:cNvPr name="Freeform 5" id="5"/>
+          <p:cNvSpPr/>
+          <p:nvPr/>
+        </p:nvSpPr>
+        <p:spPr>
+          <a:xfrm flipH="false" flipV="false" rot="0">
+            <a:off x="6141528" y="0"/>
+            <a:ext cx="3612072" cy="3391240"/>
+          </a:xfrm>
+          <a:custGeom>
+            <a:avLst/>
+            <a:gdLst/>
+            <a:ahLst/>
+            <a:cxnLst/>
+            <a:rect r="r" b="b" t="t" l="l"/>
+            <a:pathLst>
+              <a:path h="3391240" w="3612072">
+                <a:moveTo>
+                  <a:pt x="0" y="0"/>
+                </a:moveTo>
+                <a:lnTo>
+                  <a:pt x="3612072" y="0"/>
+                </a:lnTo>
+                <a:lnTo>
+                  <a:pt x="3612072" y="3391240"/>
+                </a:lnTo>
+                <a:lnTo>
+                  <a:pt x="0" y="3391240"/>
+                </a:lnTo>
+                <a:lnTo>
+                  <a:pt x="0" y="0"/>
+                </a:lnTo>
+                <a:close/>
+              </a:path>
+            </a:pathLst>
+          </a:custGeom>
+          <a:blipFill>
+            <a:blip r:embed="rId3"/>
+            <a:stretch>
+              <a:fillRect l="0" t="-5396" r="-4019" b="-5396"/>
+            </a:stretch>
+          </a:blipFill>
+        </p:spPr>
+      </p:sp>
+      <p:sp>
+        <p:nvSpPr>
+          <p:cNvPr name="Freeform 6" id="6"/>
+          <p:cNvSpPr/>
+          <p:nvPr/>
+        </p:nvSpPr>
+        <p:spPr>
+          <a:xfrm flipH="false" flipV="false" rot="0">
+            <a:off x="6141528" y="3391240"/>
+            <a:ext cx="3612072" cy="3982744"/>
+          </a:xfrm>
+          <a:custGeom>
+            <a:avLst/>
+            <a:gdLst/>
+            <a:ahLst/>
+            <a:cxnLst/>
+            <a:rect r="r" b="b" t="t" l="l"/>
+            <a:pathLst>
+              <a:path h="3982744" w="3612072">
+                <a:moveTo>
+                  <a:pt x="0" y="0"/>
+                </a:moveTo>
+                <a:lnTo>
+                  <a:pt x="3612072" y="0"/>
+                </a:lnTo>
+                <a:lnTo>
+                  <a:pt x="3612072" y="3982744"/>
+                </a:lnTo>
+                <a:lnTo>
+                  <a:pt x="0" y="3982744"/>
+                </a:lnTo>
+                <a:lnTo>
+                  <a:pt x="0" y="0"/>
+                </a:lnTo>
+                <a:close/>
+              </a:path>
+            </a:pathLst>
+          </a:custGeom>
+          <a:blipFill>
+            <a:blip r:embed="rId4"/>
+            <a:stretch>
+              <a:fillRect l="-9792" t="0" r="-469" b="0"/>
+            </a:stretch>
+          </a:blipFill>
+        </p:spPr>
+      </p:sp>
+      <p:sp>
+        <p:nvSpPr>
+          <p:cNvPr name="TextBox 7" id="7"/>
+          <p:cNvSpPr txBox="true"/>
+          <p:nvPr/>
+        </p:nvSpPr>
+        <p:spPr>
+          <a:xfrm rot="0">
+            <a:off x="600689" y="1552575"/>
+            <a:ext cx="5090287" cy="4572000"/>
+          </a:xfrm>
+          <a:prstGeom prst="rect">
+            <a:avLst/>
+          </a:prstGeom>
+        </p:spPr>
+        <p:txBody>
+          <a:bodyPr anchor="t" rtlCol="false" tIns="0" lIns="0" bIns="0" rIns="0">
+            <a:spAutoFit/>
+          </a:bodyPr>
+          <a:lstStyle/>
+          <a:p>
+            <a:pPr algn="just">
+              <a:lnSpc>
+                <a:spcPts val="2790"/>
+              </a:lnSpc>
+            </a:pPr>
+            <a:r>
+              <a:rPr lang="en-US" sz="2325">
+                <a:solidFill>
+                  <a:srgbClr val="000000"/>
+                </a:solidFill>
+                <a:latin typeface="Century Gothic Paneuropean"/>
+                <a:ea typeface="Century Gothic Paneuropean"/>
+                <a:cs typeface="Century Gothic Paneuropean"/>
+                <a:sym typeface="Century Gothic Paneuropean"/>
+              </a:rPr>
+              <a:t>     Isso começou a ser discutido por volta da década de 1980, quando o mercado de tecnologia cresceu de forma acelerada e deixou o hardware mais acessível. Assim, o software passou a ser vendido separadamente, pois até então era comum o software vir junto com o hardware comprado, inclusive com o código-fonte permitindo alterações (MOSSOF, 2014, p. 10). </a:t>
+            </a:r>
+          </a:p>
+          <a:p>
+            <a:pPr algn="just">
+              <a:lnSpc>
+                <a:spcPts val="2790"/>
+              </a:lnSpc>
+            </a:pPr>
+          </a:p>
+        </p:txBody>
+      </p:sp>
+    </p:spTree>
+  </p:cSld>
+  <p:clrMapOvr>
+    <a:masterClrMapping/>
+  </p:clrMapOvr>
+</p:sld>
+</file>
+
+<file path=ppt/slides/slide4.xml><?xml version="1.0" encoding="utf-8"?>
+<p:sld xmlns:p="http://schemas.openxmlformats.org/presentationml/2006/main" xmlns:a="http://schemas.openxmlformats.org/drawingml/2006/main" xmlns:r="http://schemas.openxmlformats.org/officeDocument/2006/relationships">
+  <p:cSld>
+    <p:bg>
+      <p:bgPr>
+        <a:gradFill rotWithShape="true">
+          <a:gsLst>
+            <a:gs pos="0">
+              <a:srgbClr val="E9F0F3">
+                <a:alpha val="100000"/>
+              </a:srgbClr>
+            </a:gs>
+            <a:gs pos="100000">
+              <a:srgbClr val="A2A5AC">
+                <a:alpha val="100000"/>
+              </a:srgbClr>
+            </a:gs>
+          </a:gsLst>
+          <a:lin ang="5400000"/>
+        </a:gradFill>
+      </p:bgPr>
+    </p:bg>
+    <p:spTree>
+      <p:nvGrpSpPr>
+        <p:cNvPr id="1" name=""/>
+        <p:cNvGrpSpPr/>
+        <p:nvPr/>
+      </p:nvGrpSpPr>
+      <p:grpSpPr>
+        <a:xfrm>
+          <a:off x="0" y="0"/>
+          <a:ext cx="0" cy="0"/>
+          <a:chOff x="0" y="0"/>
+          <a:chExt cx="0" cy="0"/>
+        </a:xfrm>
+      </p:grpSpPr>
+      <p:sp>
+        <p:nvSpPr>
+          <p:cNvPr name="Freeform 2" id="2"/>
+          <p:cNvSpPr/>
+          <p:nvPr/>
+        </p:nvSpPr>
+        <p:spPr>
+          <a:xfrm flipH="false" flipV="false" rot="0">
+            <a:off x="2386359" y="389641"/>
+            <a:ext cx="4980881" cy="1543361"/>
+          </a:xfrm>
+          <a:custGeom>
+            <a:avLst/>
+            <a:gdLst/>
+            <a:ahLst/>
+            <a:cxnLst/>
+            <a:rect r="r" b="b" t="t" l="l"/>
+            <a:pathLst>
+              <a:path h="1543361" w="4980881">
+                <a:moveTo>
+                  <a:pt x="0" y="0"/>
+                </a:moveTo>
+                <a:lnTo>
+                  <a:pt x="4980882" y="0"/>
+                </a:lnTo>
+                <a:lnTo>
+                  <a:pt x="4980882" y="1543361"/>
+                </a:lnTo>
+                <a:lnTo>
+                  <a:pt x="0" y="1543361"/>
+                </a:lnTo>
+                <a:lnTo>
+                  <a:pt x="0" y="0"/>
+                </a:lnTo>
+                <a:close/>
+              </a:path>
+            </a:pathLst>
+          </a:custGeom>
+          <a:blipFill>
+            <a:blip r:embed="rId3"/>
+            <a:stretch>
+              <a:fillRect l="0" t="-36201" r="0" b="-36201"/>
+            </a:stretch>
+          </a:blipFill>
+        </p:spPr>
+      </p:sp>
+      <p:sp>
+        <p:nvSpPr>
+          <p:cNvPr name="TextBox 3" id="3"/>
+          <p:cNvSpPr txBox="true"/>
+          <p:nvPr/>
+        </p:nvSpPr>
+        <p:spPr>
+          <a:xfrm rot="0">
+            <a:off x="731520" y="2257425"/>
+            <a:ext cx="8290560" cy="3162300"/>
+          </a:xfrm>
+          <a:prstGeom prst="rect">
+            <a:avLst/>
+          </a:prstGeom>
+        </p:spPr>
+        <p:txBody>
+          <a:bodyPr anchor="t" rtlCol="false" tIns="0" lIns="0" bIns="0" rIns="0">
+            <a:spAutoFit/>
+          </a:bodyPr>
+          <a:lstStyle/>
+          <a:p>
+            <a:pPr algn="just">
+              <a:lnSpc>
+                <a:spcPts val="2790"/>
+              </a:lnSpc>
+            </a:pPr>
+            <a:r>
+              <a:rPr lang="en-US" sz="2325">
+                <a:solidFill>
+                  <a:srgbClr val="000000"/>
+                </a:solidFill>
+                <a:latin typeface="Century Gothic Paneuropean"/>
+                <a:ea typeface="Century Gothic Paneuropean"/>
+                <a:cs typeface="Century Gothic Paneuropean"/>
+                <a:sym typeface="Century Gothic Paneuropean"/>
+              </a:rPr>
+              <a:t>    Atualmente existem as licenças proprietárias, como os contratos de EULA, que limitam o uso e resguardam os interesses das empresas, e licenças livres, como a GNU GPL, que priorizam a colaboração e o compartilhamento. Esse contraste revela uma questão atual e relevante: como equilibrar o direito à propriedade intelectual com a necessidade de democratizar o acesso à tecnologia, tema discutido por autores como Stallman (2002) e Lessig (2004).</a:t>
+            </a:r>
+          </a:p>
+        </p:txBody>
+      </p:sp>
+    </p:spTree>
+  </p:cSld>
+  <p:clrMapOvr>
+    <a:masterClrMapping/>
+  </p:clrMapOvr>
+</p:sld>
+</file>
+
+<file path=ppt/slides/slide5.xml><?xml version="1.0" encoding="utf-8"?>
+<p:sld xmlns:p="http://schemas.openxmlformats.org/presentationml/2006/main" xmlns:a="http://schemas.openxmlformats.org/drawingml/2006/main" xmlns:r="http://schemas.openxmlformats.org/officeDocument/2006/relationships">
+  <p:cSld>
+    <p:bg>
+      <p:bgPr>
+        <a:gradFill rotWithShape="true">
+          <a:gsLst>
+            <a:gs pos="0">
+              <a:srgbClr val="E9F0F3">
+                <a:alpha val="100000"/>
+              </a:srgbClr>
+            </a:gs>
+            <a:gs pos="100000">
+              <a:srgbClr val="A2A5AC">
+                <a:alpha val="100000"/>
+              </a:srgbClr>
+            </a:gs>
+          </a:gsLst>
+          <a:lin ang="5400000"/>
+        </a:gradFill>
+      </p:bgPr>
+    </p:bg>
+    <p:spTree>
+      <p:nvGrpSpPr>
+        <p:cNvPr id="1" name=""/>
+        <p:cNvGrpSpPr/>
+        <p:nvPr/>
+      </p:nvGrpSpPr>
+      <p:grpSpPr>
+        <a:xfrm>
+          <a:off x="0" y="0"/>
+          <a:ext cx="0" cy="0"/>
+          <a:chOff x="0" y="0"/>
+          <a:chExt cx="0" cy="0"/>
+        </a:xfrm>
+      </p:grpSpPr>
+      <p:grpSp>
+        <p:nvGrpSpPr>
+          <p:cNvPr name="Group 2" id="2"/>
+          <p:cNvGrpSpPr/>
+          <p:nvPr/>
+        </p:nvGrpSpPr>
+        <p:grpSpPr>
+          <a:xfrm rot="0">
+            <a:off x="221789" y="262811"/>
+            <a:ext cx="8980452" cy="840770"/>
+            <a:chOff x="0" y="0"/>
+            <a:chExt cx="11716963" cy="1096968"/>
+          </a:xfrm>
+        </p:grpSpPr>
+        <p:sp>
+          <p:nvSpPr>
+            <p:cNvPr name="Freeform 3" id="3"/>
+            <p:cNvSpPr/>
+            <p:nvPr/>
+          </p:nvSpPr>
+          <p:spPr>
+            <a:xfrm flipH="false" flipV="false" rot="0">
+              <a:off x="0" y="0"/>
+              <a:ext cx="11716962" cy="1096969"/>
+            </a:xfrm>
+            <a:custGeom>
+              <a:avLst/>
+              <a:gdLst/>
+              <a:ahLst/>
+              <a:cxnLst/>
+              <a:rect r="r" b="b" t="t" l="l"/>
+              <a:pathLst>
+                <a:path h="1096969" w="11716962">
+                  <a:moveTo>
+                    <a:pt x="0" y="0"/>
+                  </a:moveTo>
+                  <a:lnTo>
+                    <a:pt x="11716962" y="0"/>
+                  </a:lnTo>
+                  <a:lnTo>
+                    <a:pt x="11716962" y="1096969"/>
+                  </a:lnTo>
+                  <a:lnTo>
+                    <a:pt x="0" y="1096969"/>
+                  </a:lnTo>
+                  <a:close/>
+                </a:path>
+              </a:pathLst>
+            </a:custGeom>
+            <a:solidFill>
+              <a:srgbClr val="000000">
+                <a:alpha val="0"/>
+              </a:srgbClr>
+            </a:solidFill>
+          </p:spPr>
+        </p:sp>
+        <p:sp>
+          <p:nvSpPr>
+            <p:cNvPr name="TextBox 4" id="4"/>
+            <p:cNvSpPr txBox="true"/>
+            <p:nvPr/>
+          </p:nvSpPr>
+          <p:spPr>
+            <a:xfrm>
+              <a:off x="0" y="-9525"/>
+              <a:ext cx="11716963" cy="1106493"/>
+            </a:xfrm>
+            <a:prstGeom prst="rect">
+              <a:avLst/>
+            </a:prstGeom>
+          </p:spPr>
+          <p:txBody>
+            <a:bodyPr anchor="ctr" rtlCol="false" tIns="0" lIns="0" bIns="0" rIns="0"/>
+            <a:lstStyle/>
+            <a:p>
+              <a:pPr algn="ctr">
+                <a:lnSpc>
+                  <a:spcPts val="2879"/>
+                </a:lnSpc>
+              </a:pPr>
+              <a:r>
+                <a:rPr lang="en-US" sz="2400">
+                  <a:solidFill>
+                    <a:srgbClr val="000000"/>
+                  </a:solidFill>
+                  <a:latin typeface="Arial"/>
+                  <a:ea typeface="Arial"/>
+                  <a:cs typeface="Arial"/>
+                  <a:sym typeface="Arial"/>
+                </a:rPr>
+                <a:t>Objetivo</a:t>
+              </a:r>
+            </a:p>
+          </p:txBody>
+        </p:sp>
+      </p:grpSp>
+      <p:sp>
+        <p:nvSpPr>
+          <p:cNvPr name="Freeform 5" id="5"/>
+          <p:cNvSpPr/>
+          <p:nvPr/>
+        </p:nvSpPr>
+        <p:spPr>
+          <a:xfrm flipH="false" flipV="false" rot="0">
+            <a:off x="6047972" y="3578676"/>
+            <a:ext cx="3475491" cy="3878057"/>
+          </a:xfrm>
+          <a:custGeom>
+            <a:avLst/>
+            <a:gdLst/>
+            <a:ahLst/>
+            <a:cxnLst/>
+            <a:rect r="r" b="b" t="t" l="l"/>
+            <a:pathLst>
+              <a:path h="3878057" w="3475491">
+                <a:moveTo>
+                  <a:pt x="0" y="0"/>
+                </a:moveTo>
+                <a:lnTo>
+                  <a:pt x="3475491" y="0"/>
+                </a:lnTo>
+                <a:lnTo>
+                  <a:pt x="3475491" y="3878056"/>
+                </a:lnTo>
+                <a:lnTo>
+                  <a:pt x="0" y="3878056"/>
+                </a:lnTo>
+                <a:lnTo>
+                  <a:pt x="0" y="0"/>
+                </a:lnTo>
+                <a:close/>
+              </a:path>
+            </a:pathLst>
+          </a:custGeom>
+          <a:blipFill>
+            <a:blip r:embed="rId3"/>
+            <a:stretch>
+              <a:fillRect l="0" t="0" r="-4888" b="0"/>
+            </a:stretch>
+          </a:blipFill>
+        </p:spPr>
+      </p:sp>
+      <p:sp>
+        <p:nvSpPr>
+          <p:cNvPr name="TextBox 6" id="6"/>
+          <p:cNvSpPr txBox="true"/>
+          <p:nvPr/>
+        </p:nvSpPr>
+        <p:spPr>
+          <a:xfrm rot="0">
+            <a:off x="651879" y="1490178"/>
+            <a:ext cx="8120272" cy="2809875"/>
+          </a:xfrm>
+          <a:prstGeom prst="rect">
+            <a:avLst/>
+          </a:prstGeom>
+        </p:spPr>
+        <p:txBody>
+          <a:bodyPr anchor="t" rtlCol="false" tIns="0" lIns="0" bIns="0" rIns="0">
+            <a:spAutoFit/>
+          </a:bodyPr>
+          <a:lstStyle/>
+          <a:p>
+            <a:pPr algn="just">
+              <a:lnSpc>
+                <a:spcPts val="2790"/>
+              </a:lnSpc>
+            </a:pPr>
+            <a:r>
+              <a:rPr lang="en-US" sz="2325">
+                <a:solidFill>
+                  <a:srgbClr val="000000"/>
+                </a:solidFill>
+                <a:latin typeface="Century Gothic Paneuropean"/>
+                <a:ea typeface="Century Gothic Paneuropean"/>
+                <a:cs typeface="Century Gothic Paneuropean"/>
+                <a:sym typeface="Century Gothic Paneuropean"/>
+              </a:rPr>
+              <a:t>Compreender os diferentes tipos de licenciamento de software existentes e analisar suas implicações legais, técnicas e sociais.</a:t>
+            </a:r>
+          </a:p>
+          <a:p>
+            <a:pPr algn="just">
+              <a:lnSpc>
+                <a:spcPts val="2790"/>
+              </a:lnSpc>
+            </a:pPr>
+            <a:r>
+              <a:rPr lang="en-US" sz="2325">
+                <a:solidFill>
+                  <a:srgbClr val="000000"/>
+                </a:solidFill>
+                <a:latin typeface="Century Gothic Paneuropean"/>
+                <a:ea typeface="Century Gothic Paneuropean"/>
+                <a:cs typeface="Century Gothic Paneuropean"/>
+                <a:sym typeface="Century Gothic Paneuropean"/>
+              </a:rPr>
+              <a:t>Esta pesquisa justifica-se pela importância do software atualmente, tornando indispensável a compreensão das regras de uso e distribuição, do ponto de vista teórico, jurídico e filosófico.</a:t>
+            </a:r>
+          </a:p>
+          <a:p>
+            <a:pPr algn="just">
+              <a:lnSpc>
+                <a:spcPts val="2790"/>
+              </a:lnSpc>
+            </a:pPr>
+          </a:p>
+        </p:txBody>
+      </p:sp>
+    </p:spTree>
+  </p:cSld>
+  <p:clrMapOvr>
+    <a:masterClrMapping/>
+  </p:clrMapOvr>
+</p:sld>
+</file>
+
+<file path=ppt/slides/slide6.xml><?xml version="1.0" encoding="utf-8"?>
+<p:sld xmlns:p="http://schemas.openxmlformats.org/presentationml/2006/main" xmlns:a="http://schemas.openxmlformats.org/drawingml/2006/main">
+  <p:cSld>
+    <p:bg>
+      <p:bgPr>
+        <a:gradFill rotWithShape="true">
+          <a:gsLst>
+            <a:gs pos="0">
+              <a:srgbClr val="E9F0F3">
+                <a:alpha val="100000"/>
+              </a:srgbClr>
+            </a:gs>
+            <a:gs pos="100000">
+              <a:srgbClr val="A2A5AC">
+                <a:alpha val="100000"/>
+              </a:srgbClr>
+            </a:gs>
+          </a:gsLst>
+          <a:lin ang="5400000"/>
+        </a:gradFill>
+      </p:bgPr>
+    </p:bg>
+    <p:spTree>
+      <p:nvGrpSpPr>
+        <p:cNvPr id="1" name=""/>
+        <p:cNvGrpSpPr/>
+        <p:nvPr/>
+      </p:nvGrpSpPr>
+      <p:grpSpPr>
+        <a:xfrm>
+          <a:off x="0" y="0"/>
+          <a:ext cx="0" cy="0"/>
+          <a:chOff x="0" y="0"/>
+          <a:chExt cx="0" cy="0"/>
+        </a:xfrm>
+      </p:grpSpPr>
+      <p:sp>
+        <p:nvSpPr>
+          <p:cNvPr name="TextBox 2" id="2"/>
+          <p:cNvSpPr txBox="true"/>
+          <p:nvPr/>
+        </p:nvSpPr>
+        <p:spPr>
+          <a:xfrm rot="0">
+            <a:off x="2751836" y="369367"/>
+            <a:ext cx="5169378" cy="471328"/>
+          </a:xfrm>
+          <a:prstGeom prst="rect">
+            <a:avLst/>
+          </a:prstGeom>
+        </p:spPr>
+        <p:txBody>
+          <a:bodyPr anchor="t" rtlCol="false" tIns="0" lIns="0" bIns="0" rIns="0">
+            <a:spAutoFit/>
+          </a:bodyPr>
+          <a:lstStyle/>
+          <a:p>
+            <a:pPr algn="l">
+              <a:lnSpc>
+                <a:spcPts val="3586"/>
+              </a:lnSpc>
+            </a:pPr>
+            <a:r>
+              <a:rPr lang="en-US" sz="3320">
+                <a:solidFill>
+                  <a:srgbClr val="000000"/>
+                </a:solidFill>
+                <a:latin typeface="Arial"/>
+                <a:ea typeface="Arial"/>
+                <a:cs typeface="Arial"/>
+                <a:sym typeface="Arial"/>
+              </a:rPr>
+              <a:t>Software Propietário</a:t>
+            </a:r>
+          </a:p>
+        </p:txBody>
+      </p:sp>
+      <p:sp>
+        <p:nvSpPr>
+          <p:cNvPr name="TextBox 3" id="3"/>
+          <p:cNvSpPr txBox="true"/>
+          <p:nvPr/>
+        </p:nvSpPr>
+        <p:spPr>
+          <a:xfrm rot="0">
+            <a:off x="337938" y="1124585"/>
+            <a:ext cx="9077725" cy="5459095"/>
+          </a:xfrm>
+          <a:prstGeom prst="rect">
+            <a:avLst/>
+          </a:prstGeom>
+        </p:spPr>
+        <p:txBody>
+          <a:bodyPr anchor="t" rtlCol="false" tIns="0" lIns="0" bIns="0" rIns="0">
+            <a:spAutoFit/>
+          </a:bodyPr>
+          <a:lstStyle/>
+          <a:p>
+            <a:pPr algn="ctr">
+              <a:lnSpc>
+                <a:spcPts val="3079"/>
+              </a:lnSpc>
+            </a:pPr>
+            <a:r>
+              <a:rPr lang="en-US" sz="2199">
+                <a:solidFill>
+                  <a:srgbClr val="000000"/>
+                </a:solidFill>
+                <a:latin typeface="Century Gothic Paneuropean"/>
+                <a:ea typeface="Century Gothic Paneuropean"/>
+                <a:cs typeface="Century Gothic Paneuropean"/>
+                <a:sym typeface="Century Gothic Paneuropean"/>
+              </a:rPr>
+              <a:t>O software proprietário caracteriza-se pela restrição do acesso ao código-fonte, limitando a modificação e a redistribuição. Segundo a UNESCO (2017), “o software proprietário é aquele cuja licença impede ou restringe a cópia, modificação e distribuição, sendo o fornecedor o detentor dos direitos exclusivos” (UNESCO, 2017, p. 12).</a:t>
+            </a:r>
+          </a:p>
+          <a:p>
+            <a:pPr algn="ctr">
+              <a:lnSpc>
+                <a:spcPts val="3079"/>
+              </a:lnSpc>
+            </a:pPr>
+          </a:p>
+          <a:p>
+            <a:pPr algn="ctr">
+              <a:lnSpc>
+                <a:spcPts val="3079"/>
+              </a:lnSpc>
+            </a:pPr>
+          </a:p>
+          <a:p>
+            <a:pPr algn="ctr">
+              <a:lnSpc>
+                <a:spcPts val="3079"/>
+              </a:lnSpc>
+            </a:pPr>
+            <a:r>
+              <a:rPr lang="en-US" sz="2199">
+                <a:solidFill>
+                  <a:srgbClr val="000000"/>
+                </a:solidFill>
+                <a:latin typeface="Century Gothic Paneuropean"/>
+                <a:ea typeface="Century Gothic Paneuropean"/>
+                <a:cs typeface="Century Gothic Paneuropean"/>
+                <a:sym typeface="Century Gothic Paneuropean"/>
+              </a:rPr>
+              <a:t>Entre as vantagens, destacam-se a segurança, a confiabilidade e o suporte técnico fornecido pelo desenvolvedor. Por outro lado, apresentam-se como desvantagens os altos custos, a dependência de fornecedores e a falta de autonomia do usuário (SOARES, 2020).</a:t>
+            </a:r>
+          </a:p>
+          <a:p>
+            <a:pPr algn="ctr">
+              <a:lnSpc>
+                <a:spcPts val="3079"/>
+              </a:lnSpc>
+            </a:pPr>
+          </a:p>
+        </p:txBody>
+      </p:sp>
+    </p:spTree>
+  </p:cSld>
+  <p:clrMapOvr>
+    <a:masterClrMapping/>
+  </p:clrMapOvr>
+</p:sld>
+</file>
+
+<file path=ppt/slides/slide7.xml><?xml version="1.0" encoding="utf-8"?>
+<p:sld xmlns:p="http://schemas.openxmlformats.org/presentationml/2006/main" xmlns:a="http://schemas.openxmlformats.org/drawingml/2006/main" xmlns:r="http://schemas.openxmlformats.org/officeDocument/2006/relationships">
+  <p:cSld>
+    <p:bg>
+      <p:bgPr>
+        <a:gradFill rotWithShape="true">
+          <a:gsLst>
+            <a:gs pos="0">
+              <a:srgbClr val="E9F0F3">
+                <a:alpha val="100000"/>
+              </a:srgbClr>
+            </a:gs>
+            <a:gs pos="100000">
+              <a:srgbClr val="A2A5AC">
+                <a:alpha val="100000"/>
+              </a:srgbClr>
+            </a:gs>
+          </a:gsLst>
+          <a:lin ang="5400000"/>
+        </a:gradFill>
+      </p:bgPr>
+    </p:bg>
+    <p:spTree>
+      <p:nvGrpSpPr>
+        <p:cNvPr id="1" name=""/>
+        <p:cNvGrpSpPr/>
+        <p:nvPr/>
+      </p:nvGrpSpPr>
+      <p:grpSpPr>
+        <a:xfrm>
+          <a:off x="0" y="0"/>
+          <a:ext cx="0" cy="0"/>
+          <a:chOff x="0" y="0"/>
+          <a:chExt cx="0" cy="0"/>
+        </a:xfrm>
+      </p:grpSpPr>
+      <p:sp>
+        <p:nvSpPr>
+          <p:cNvPr name="Freeform 2" id="2"/>
+          <p:cNvSpPr/>
+          <p:nvPr/>
+        </p:nvSpPr>
+        <p:spPr>
+          <a:xfrm flipH="false" flipV="false" rot="0">
+            <a:off x="-3734545" y="-1064629"/>
+            <a:ext cx="23881537" cy="13433365"/>
+          </a:xfrm>
+          <a:custGeom>
+            <a:avLst/>
+            <a:gdLst/>
+            <a:ahLst/>
+            <a:cxnLst/>
+            <a:rect r="r" b="b" t="t" l="l"/>
+            <a:pathLst>
+              <a:path h="13433365" w="23881537">
+                <a:moveTo>
+                  <a:pt x="0" y="0"/>
+                </a:moveTo>
+                <a:lnTo>
+                  <a:pt x="23881538" y="0"/>
+                </a:lnTo>
+                <a:lnTo>
+                  <a:pt x="23881538" y="13433364"/>
+                </a:lnTo>
+                <a:lnTo>
+                  <a:pt x="0" y="13433364"/>
+                </a:lnTo>
+                <a:lnTo>
+                  <a:pt x="0" y="0"/>
+                </a:lnTo>
+                <a:close/>
+              </a:path>
+            </a:pathLst>
+          </a:custGeom>
+          <a:blipFill>
+            <a:blip r:embed="rId3"/>
+            <a:stretch>
+              <a:fillRect l="0" t="0" r="0" b="0"/>
+            </a:stretch>
+          </a:blipFill>
+        </p:spPr>
+      </p:sp>
+      <p:sp>
+        <p:nvSpPr>
+          <p:cNvPr name="TextBox 3" id="3"/>
+          <p:cNvSpPr txBox="true"/>
+          <p:nvPr/>
+        </p:nvSpPr>
+        <p:spPr>
+          <a:xfrm rot="0">
+            <a:off x="2441087" y="977241"/>
+            <a:ext cx="6001268" cy="561300"/>
+          </a:xfrm>
+          <a:prstGeom prst="rect">
+            <a:avLst/>
+          </a:prstGeom>
+        </p:spPr>
+        <p:txBody>
+          <a:bodyPr anchor="t" rtlCol="false" tIns="0" lIns="0" bIns="0" rIns="0">
+            <a:spAutoFit/>
+          </a:bodyPr>
+          <a:lstStyle/>
+          <a:p>
+            <a:pPr algn="l">
+              <a:lnSpc>
+                <a:spcPts val="4163"/>
+              </a:lnSpc>
+            </a:pPr>
+            <a:r>
+              <a:rPr lang="en-US" sz="3854">
+                <a:solidFill>
+                  <a:srgbClr val="000000"/>
+                </a:solidFill>
+                <a:latin typeface="Arial"/>
+                <a:ea typeface="Arial"/>
+                <a:cs typeface="Arial"/>
+                <a:sym typeface="Arial"/>
+              </a:rPr>
+              <a:t>Software Propietário</a:t>
+            </a:r>
+          </a:p>
+        </p:txBody>
+      </p:sp>
+      <p:sp>
+        <p:nvSpPr>
+          <p:cNvPr name="TextBox 4" id="4"/>
+          <p:cNvSpPr txBox="true"/>
+          <p:nvPr/>
+        </p:nvSpPr>
+        <p:spPr>
+          <a:xfrm rot="0">
+            <a:off x="536724" y="2009130"/>
+            <a:ext cx="8574962" cy="2334895"/>
+          </a:xfrm>
+          <a:prstGeom prst="rect">
+            <a:avLst/>
+          </a:prstGeom>
+        </p:spPr>
+        <p:txBody>
+          <a:bodyPr anchor="t" rtlCol="false" tIns="0" lIns="0" bIns="0" rIns="0">
+            <a:spAutoFit/>
+          </a:bodyPr>
+          <a:lstStyle/>
+          <a:p>
+            <a:pPr algn="ctr">
+              <a:lnSpc>
+                <a:spcPts val="3079"/>
+              </a:lnSpc>
+            </a:pPr>
+            <a:r>
+              <a:rPr lang="en-US" sz="2199">
+                <a:solidFill>
+                  <a:srgbClr val="000000"/>
+                </a:solidFill>
+                <a:latin typeface="Century Gothic Paneuropean"/>
+                <a:ea typeface="Century Gothic Paneuropean"/>
+                <a:cs typeface="Century Gothic Paneuropean"/>
+                <a:sym typeface="Century Gothic Paneuropean"/>
+              </a:rPr>
+              <a:t>O software proprietário, segundo (Hexsel, 2005) envolve a utilização de formatos para a codificação da informação manipulada pelos aplicativos, que se torna especialmente sério no caso dos conjuntos de aplicativos para escritório, em razão de rápida disseminação e utilização.</a:t>
+            </a:r>
+          </a:p>
+          <a:p>
+            <a:pPr algn="ctr">
+              <a:lnSpc>
+                <a:spcPts val="3079"/>
+              </a:lnSpc>
+            </a:pPr>
+          </a:p>
+        </p:txBody>
+      </p:sp>
+    </p:spTree>
+  </p:cSld>
+  <p:clrMapOvr>
+    <a:masterClrMapping/>
+  </p:clrMapOvr>
+</p:sld>
+</file>
+
+<file path=ppt/slides/slide8.xml><?xml version="1.0" encoding="utf-8"?>
+<p:sld xmlns:p="http://schemas.openxmlformats.org/presentationml/2006/main" xmlns:a="http://schemas.openxmlformats.org/drawingml/2006/main" xmlns:r="http://schemas.openxmlformats.org/officeDocument/2006/relationships">
+  <p:cSld>
+    <p:bg>
+      <p:bgPr>
+        <a:solidFill>
+          <a:srgbClr val="A6A6A6"/>
+        </a:solidFill>
+      </p:bgPr>
+    </p:bg>
+    <p:spTree>
+      <p:nvGrpSpPr>
+        <p:cNvPr id="1" name=""/>
+        <p:cNvGrpSpPr/>
+        <p:nvPr/>
+      </p:nvGrpSpPr>
+      <p:grpSpPr>
+        <a:xfrm>
+          <a:off x="0" y="0"/>
+          <a:ext cx="0" cy="0"/>
+          <a:chOff x="0" y="0"/>
+          <a:chExt cx="0" cy="0"/>
+        </a:xfrm>
+      </p:grpSpPr>
+      <p:sp>
+        <p:nvSpPr>
+          <p:cNvPr name="Freeform 2" id="2"/>
+          <p:cNvSpPr/>
+          <p:nvPr/>
+        </p:nvSpPr>
+        <p:spPr>
+          <a:xfrm flipH="false" flipV="false" rot="0">
+            <a:off x="1351175" y="5219385"/>
+            <a:ext cx="7041689" cy="1728798"/>
+          </a:xfrm>
+          <a:custGeom>
+            <a:avLst/>
+            <a:gdLst/>
+            <a:ahLst/>
+            <a:cxnLst/>
+            <a:rect r="r" b="b" t="t" l="l"/>
+            <a:pathLst>
+              <a:path h="1728798" w="7041689">
+                <a:moveTo>
+                  <a:pt x="0" y="0"/>
+                </a:moveTo>
+                <a:lnTo>
+                  <a:pt x="7041689" y="0"/>
+                </a:lnTo>
+                <a:lnTo>
+                  <a:pt x="7041689" y="1728798"/>
+                </a:lnTo>
+                <a:lnTo>
+                  <a:pt x="0" y="1728798"/>
+                </a:lnTo>
+                <a:lnTo>
+                  <a:pt x="0" y="0"/>
+                </a:lnTo>
+                <a:close/>
+              </a:path>
+            </a:pathLst>
+          </a:custGeom>
+          <a:blipFill>
+            <a:blip r:embed="rId3"/>
+            <a:stretch>
+              <a:fillRect l="0" t="0" r="0" b="0"/>
+            </a:stretch>
+          </a:blipFill>
+        </p:spPr>
+      </p:sp>
+      <p:sp>
+        <p:nvSpPr>
+          <p:cNvPr name="TextBox 3" id="3"/>
+          <p:cNvSpPr txBox="true"/>
+          <p:nvPr/>
+        </p:nvSpPr>
+        <p:spPr>
+          <a:xfrm rot="0">
+            <a:off x="536724" y="750570"/>
+            <a:ext cx="9022080" cy="561300"/>
+          </a:xfrm>
+          <a:prstGeom prst="rect">
+            <a:avLst/>
+          </a:prstGeom>
+        </p:spPr>
+        <p:txBody>
+          <a:bodyPr anchor="t" rtlCol="false" tIns="0" lIns="0" bIns="0" rIns="0">
+            <a:spAutoFit/>
+          </a:bodyPr>
+          <a:lstStyle/>
+          <a:p>
+            <a:pPr algn="l">
+              <a:lnSpc>
+                <a:spcPts val="4163"/>
+              </a:lnSpc>
+            </a:pPr>
+            <a:r>
+              <a:rPr lang="en-US" sz="3854">
+                <a:solidFill>
+                  <a:srgbClr val="000000"/>
+                </a:solidFill>
+                <a:latin typeface="Arial"/>
+                <a:ea typeface="Arial"/>
+                <a:cs typeface="Arial"/>
+                <a:sym typeface="Arial"/>
+              </a:rPr>
+              <a:t>SOFTWARE LIVRE E OPEN SOURCE</a:t>
+            </a:r>
+          </a:p>
+        </p:txBody>
+      </p:sp>
+      <p:sp>
+        <p:nvSpPr>
+          <p:cNvPr name="TextBox 4" id="4"/>
+          <p:cNvSpPr txBox="true"/>
+          <p:nvPr/>
+        </p:nvSpPr>
+        <p:spPr>
+          <a:xfrm rot="0">
+            <a:off x="634738" y="1858949"/>
+            <a:ext cx="8484124" cy="2334895"/>
+          </a:xfrm>
+          <a:prstGeom prst="rect">
+            <a:avLst/>
+          </a:prstGeom>
+        </p:spPr>
+        <p:txBody>
+          <a:bodyPr anchor="t" rtlCol="false" tIns="0" lIns="0" bIns="0" rIns="0">
+            <a:spAutoFit/>
+          </a:bodyPr>
+          <a:lstStyle/>
+          <a:p>
+            <a:pPr algn="just">
+              <a:lnSpc>
+                <a:spcPts val="3079"/>
+              </a:lnSpc>
+            </a:pPr>
+            <a:r>
+              <a:rPr lang="en-US" sz="2199">
+                <a:solidFill>
+                  <a:srgbClr val="000000"/>
+                </a:solidFill>
+                <a:latin typeface="Century Gothic Paneuropean"/>
+                <a:ea typeface="Century Gothic Paneuropean"/>
+                <a:cs typeface="Century Gothic Paneuropean"/>
+                <a:sym typeface="Century Gothic Paneuropean"/>
+              </a:rPr>
+              <a:t>Permitem que o usuário execute, copie, distribua, estude, modifique e melhore o software, conforme definido pela Free Software Foundation (FSF). De acordo com esta instituição, “a liberdade de modificar o programa para adaptá-lo às suas necessidades é um dos pilares da filosofia do software livre” (Free Software Foundation, s.d).</a:t>
+            </a:r>
+          </a:p>
+        </p:txBody>
+      </p:sp>
+    </p:spTree>
+  </p:cSld>
+  <p:clrMapOvr>
+    <a:masterClrMapping/>
+  </p:clrMapOvr>
+</p:sld>
+</file>
+
+<file path=ppt/slides/slide9.xml><?xml version="1.0" encoding="utf-8"?>
+<p:sld xmlns:p="http://schemas.openxmlformats.org/presentationml/2006/main" xmlns:a="http://schemas.openxmlformats.org/drawingml/2006/main" xmlns:r="http://schemas.openxmlformats.org/officeDocument/2006/relationships">
+  <p:cSld>
+    <p:bg>
+      <p:bgPr>
+        <a:gradFill rotWithShape="true">
+          <a:gsLst>
+            <a:gs pos="0">
+              <a:srgbClr val="E9F0F3">
+                <a:alpha val="100000"/>
+              </a:srgbClr>
+            </a:gs>
+            <a:gs pos="100000">
+              <a:srgbClr val="A2A5AC">
+                <a:alpha val="100000"/>
+              </a:srgbClr>
+            </a:gs>
+          </a:gsLst>
+          <a:lin ang="5400000"/>
+        </a:gradFill>
+      </p:bgPr>
+    </p:bg>
+    <p:spTree>
+      <p:nvGrpSpPr>
+        <p:cNvPr id="1" name=""/>
+        <p:cNvGrpSpPr/>
+        <p:nvPr/>
+      </p:nvGrpSpPr>
+      <p:grpSpPr>
+        <a:xfrm>
+          <a:off x="0" y="0"/>
+          <a:ext cx="0" cy="0"/>
+          <a:chOff x="0" y="0"/>
+          <a:chExt cx="0" cy="0"/>
+        </a:xfrm>
+      </p:grpSpPr>
+      <p:pic>
+        <p:nvPicPr>
+          <p:cNvPr name="Picture 2" id="2"/>
+          <p:cNvPicPr>
+            <a:picLocks noChangeAspect="true"/>
+          </p:cNvPicPr>
+          <p:nvPr/>
+        </p:nvPicPr>
+        <p:blipFill>
+          <a:blip r:embed="rId3"/>
+          <a:srcRect l="0" t="0" r="0" b="0"/>
+          <a:stretch>
+            <a:fillRect/>
+          </a:stretch>
+        </p:blipFill>
+        <p:spPr>
+          <a:xfrm flipH="false" flipV="false" rot="0">
+            <a:off x="6940909" y="4496639"/>
+            <a:ext cx="2279565" cy="2438975"/>
+          </a:xfrm>
+          <a:prstGeom prst="rect">
+            <a:avLst/>
+          </a:prstGeom>
+        </p:spPr>
+      </p:pic>
+      <p:sp>
+        <p:nvSpPr>
+          <p:cNvPr name="TextBox 3" id="3"/>
+          <p:cNvSpPr txBox="true"/>
+          <p:nvPr/>
+        </p:nvSpPr>
+        <p:spPr>
+          <a:xfrm rot="0">
+            <a:off x="731520" y="1013129"/>
+            <a:ext cx="8290560" cy="3106420"/>
+          </a:xfrm>
+          <a:prstGeom prst="rect">
+            <a:avLst/>
+          </a:prstGeom>
+        </p:spPr>
+        <p:txBody>
+          <a:bodyPr anchor="t" rtlCol="false" tIns="0" lIns="0" bIns="0" rIns="0">
+            <a:spAutoFit/>
+          </a:bodyPr>
+          <a:lstStyle/>
+          <a:p>
+            <a:pPr algn="just">
+              <a:lnSpc>
+                <a:spcPts val="3079"/>
+              </a:lnSpc>
+            </a:pPr>
+            <a:r>
+              <a:rPr lang="en-US" sz="2199">
+                <a:solidFill>
+                  <a:srgbClr val="000000"/>
+                </a:solidFill>
+                <a:latin typeface="Open Sans"/>
+                <a:ea typeface="Open Sans"/>
+                <a:cs typeface="Open Sans"/>
+                <a:sym typeface="Open Sans"/>
+              </a:rPr>
+              <a:t> </a:t>
+            </a:r>
+          </a:p>
+          <a:p>
+            <a:pPr algn="just">
+              <a:lnSpc>
+                <a:spcPts val="3079"/>
+              </a:lnSpc>
+            </a:pPr>
+            <a:r>
+              <a:rPr lang="en-US" sz="2199">
+                <a:solidFill>
+                  <a:srgbClr val="000000"/>
+                </a:solidFill>
+                <a:latin typeface="Century Gothic Paneuropean"/>
+                <a:ea typeface="Century Gothic Paneuropean"/>
+                <a:cs typeface="Century Gothic Paneuropean"/>
+                <a:sym typeface="Century Gothic Paneuropean"/>
+              </a:rPr>
+              <a:t> </a:t>
+            </a:r>
+            <a:r>
+              <a:rPr lang="en-US" sz="2199">
+                <a:solidFill>
+                  <a:srgbClr val="000000"/>
+                </a:solidFill>
+                <a:latin typeface="Century Gothic Paneuropean"/>
+                <a:ea typeface="Century Gothic Paneuropean"/>
+                <a:cs typeface="Century Gothic Paneuropean"/>
+                <a:sym typeface="Century Gothic Paneuropean"/>
+              </a:rPr>
+              <a:t>Em termos práticos, essa modalidade possibilita redução de custos e maior flexibilidade, além de promover inovação colaborativa. Porém, estudos apontam que a falta de suporte profissional estruturado pode gerar dificuldades, sobretudo em ambientes empresariais de grande porte (SOUZA; PEREIRA, 2021).</a:t>
+            </a:r>
+          </a:p>
+          <a:p>
+            <a:pPr algn="just">
+              <a:lnSpc>
+                <a:spcPts val="3079"/>
+              </a:lnSpc>
+            </a:pPr>
+          </a:p>
+        </p:txBody>
+      </p:sp>
     </p:spTree>
   </p:cSld>
   <p:clrMapOvr>

</xml_diff>